<commit_message>
Minor formatting. Update Nikhil's image.
</commit_message>
<xml_diff>
--- a/Presentation/NOLA_Midterm_Presentation_v1.2.pptx
+++ b/Presentation/NOLA_Midterm_Presentation_v1.2.pptx
@@ -1465,6 +1465,98 @@
     <p:extLst>
       <p:ext uri="{BB962C8B-B14F-4D97-AF65-F5344CB8AC3E}">
         <p14:creationId xmlns:p14="http://schemas.microsoft.com/office/powerpoint/2010/main" val="2370076311"/>
+      </p:ext>
+    </p:extLst>
+  </p:cSld>
+  <p:clrMapOvr>
+    <a:masterClrMapping/>
+  </p:clrMapOvr>
+</p:notes>
+</file>
+
+<file path=ppt/notesSlides/notesSlide18.xml><?xml version="1.0" encoding="utf-8"?>
+<p:notes xmlns:a="http://schemas.openxmlformats.org/drawingml/2006/main" xmlns:r="http://schemas.openxmlformats.org/officeDocument/2006/relationships" xmlns:p="http://schemas.openxmlformats.org/presentationml/2006/main">
+  <p:cSld>
+    <p:spTree>
+      <p:nvGrpSpPr>
+        <p:cNvPr id="1" name=""/>
+        <p:cNvGrpSpPr/>
+        <p:nvPr/>
+      </p:nvGrpSpPr>
+      <p:grpSpPr>
+        <a:xfrm>
+          <a:off x="0" y="0"/>
+          <a:ext cx="0" cy="0"/>
+          <a:chOff x="0" y="0"/>
+          <a:chExt cx="0" cy="0"/>
+        </a:xfrm>
+      </p:grpSpPr>
+      <p:sp>
+        <p:nvSpPr>
+          <p:cNvPr id="2" name="Slide Image Placeholder 1"/>
+          <p:cNvSpPr>
+            <a:spLocks noGrp="1" noRot="1" noChangeAspect="1"/>
+          </p:cNvSpPr>
+          <p:nvPr>
+            <p:ph type="sldImg"/>
+          </p:nvPr>
+        </p:nvSpPr>
+        <p:spPr/>
+      </p:sp>
+      <p:sp>
+        <p:nvSpPr>
+          <p:cNvPr id="3" name="Notes Placeholder 2"/>
+          <p:cNvSpPr>
+            <a:spLocks noGrp="1"/>
+          </p:cNvSpPr>
+          <p:nvPr>
+            <p:ph type="body" idx="1"/>
+          </p:nvPr>
+        </p:nvSpPr>
+        <p:spPr/>
+        <p:txBody>
+          <a:bodyPr/>
+          <a:lstStyle/>
+          <a:p>
+            <a:r>
+              <a:rPr lang="en-US" dirty="0"/>
+              <a:t>The image gets pixelated when viewed on </a:t>
+            </a:r>
+            <a:r>
+              <a:rPr lang="en-US"/>
+              <a:t>large screen</a:t>
+            </a:r>
+            <a:endParaRPr lang="en-US"/>
+          </a:p>
+        </p:txBody>
+      </p:sp>
+      <p:sp>
+        <p:nvSpPr>
+          <p:cNvPr id="4" name="Slide Number Placeholder 3"/>
+          <p:cNvSpPr>
+            <a:spLocks noGrp="1"/>
+          </p:cNvSpPr>
+          <p:nvPr>
+            <p:ph type="sldNum" sz="quarter" idx="10"/>
+          </p:nvPr>
+        </p:nvSpPr>
+        <p:spPr/>
+        <p:txBody>
+          <a:bodyPr/>
+          <a:lstStyle/>
+          <a:p>
+            <a:fld id="{17221C13-30DA-4E71-8DF4-961BA98FF8DA}" type="slidenum">
+              <a:rPr lang="en-US" smtClean="0"/>
+              <a:t>22</a:t>
+            </a:fld>
+            <a:endParaRPr lang="en-US"/>
+          </a:p>
+        </p:txBody>
+      </p:sp>
+    </p:spTree>
+    <p:extLst>
+      <p:ext uri="{BB962C8B-B14F-4D97-AF65-F5344CB8AC3E}">
+        <p14:creationId xmlns:p14="http://schemas.microsoft.com/office/powerpoint/2010/main" val="2638144593"/>
       </p:ext>
     </p:extLst>
   </p:cSld>
@@ -7803,7 +7895,14 @@
           </a:p>
           <a:p>
             <a:pPr algn="ctr"/>
-            <a:endParaRPr lang="en-US" dirty="0"/>
+            <a:r>
+              <a:rPr lang="en-US" dirty="0">
+                <a:solidFill>
+                  <a:schemeClr val="tx1"/>
+                </a:solidFill>
+              </a:rPr>
+              <a:t>NOPD</a:t>
+            </a:r>
           </a:p>
           <a:p>
             <a:pPr algn="ctr"/>
@@ -7817,6 +7916,24 @@
             <a:r>
               <a:rPr lang="en-US" dirty="0"/>
               <a:t>2. Tackle missing data</a:t>
+            </a:r>
+          </a:p>
+          <a:p>
+            <a:pPr algn="ctr"/>
+            <a:r>
+              <a:rPr lang="en-US" dirty="0">
+                <a:solidFill>
+                  <a:schemeClr val="tx1"/>
+                </a:solidFill>
+              </a:rPr>
+              <a:t>CMU</a:t>
+            </a:r>
+          </a:p>
+          <a:p>
+            <a:pPr algn="ctr"/>
+            <a:r>
+              <a:rPr lang="en-US" dirty="0"/>
+              <a:t>3. Geocode the address to generate BEAT for 2012-1013. Have more data points.</a:t>
             </a:r>
           </a:p>
         </p:txBody>
@@ -8706,35 +8823,6 @@
           </a:p>
         </p:txBody>
       </p:sp>
-      <p:pic>
-        <p:nvPicPr>
-          <p:cNvPr id="18" name="Picture 17"/>
-          <p:cNvPicPr>
-            <a:picLocks noChangeAspect="1"/>
-          </p:cNvPicPr>
-          <p:nvPr/>
-        </p:nvPicPr>
-        <p:blipFill rotWithShape="1">
-          <a:blip r:embed="rId3">
-            <a:extLst>
-              <a:ext uri="{28A0092B-C50C-407E-A947-70E740481C1C}">
-                <a14:useLocalDpi xmlns:a14="http://schemas.microsoft.com/office/drawing/2010/main" val="0"/>
-              </a:ext>
-            </a:extLst>
-          </a:blip>
-          <a:srcRect l="25660" t="28050" r="26994" b="23325"/>
-          <a:stretch/>
-        </p:blipFill>
-        <p:spPr>
-          <a:xfrm>
-            <a:off x="10632275" y="2237645"/>
-            <a:ext cx="1253066" cy="1286934"/>
-          </a:xfrm>
-          <a:prstGeom prst="rect">
-            <a:avLst/>
-          </a:prstGeom>
-        </p:spPr>
-      </p:pic>
       <p:grpSp>
         <p:nvGrpSpPr>
           <p:cNvPr id="23" name="Group 22"/>
@@ -8806,7 +8894,7 @@
             <p:nvPr/>
           </p:nvPicPr>
           <p:blipFill rotWithShape="1">
-            <a:blip r:embed="rId4">
+            <a:blip r:embed="rId3">
               <a:extLst>
                 <a:ext uri="{28A0092B-C50C-407E-A947-70E740481C1C}">
                   <a14:useLocalDpi xmlns:a14="http://schemas.microsoft.com/office/drawing/2010/main" val="0"/>
@@ -8818,7 +8906,7 @@
           </p:blipFill>
           <p:spPr>
             <a:xfrm>
-              <a:off x="397890" y="2235333"/>
+              <a:off x="385698" y="2223141"/>
               <a:ext cx="1280160" cy="1280160"/>
             </a:xfrm>
             <a:prstGeom prst="rect">
@@ -8872,7 +8960,7 @@
           <p:nvPr/>
         </p:nvPicPr>
         <p:blipFill rotWithShape="1">
-          <a:blip r:embed="rId5">
+          <a:blip r:embed="rId4">
             <a:extLst>
               <a:ext uri="{28A0092B-C50C-407E-A947-70E740481C1C}">
                 <a14:useLocalDpi xmlns:a14="http://schemas.microsoft.com/office/drawing/2010/main" val="0"/>
@@ -9216,6 +9304,36 @@
           <p:cNvPr id="14" name="Picture 13"/>
           <p:cNvPicPr>
             <a:picLocks/>
+          </p:cNvPicPr>
+          <p:nvPr/>
+        </p:nvPicPr>
+        <p:blipFill>
+          <a:blip r:embed="rId5">
+            <a:extLst>
+              <a:ext uri="{28A0092B-C50C-407E-A947-70E740481C1C}">
+                <a14:useLocalDpi xmlns:a14="http://schemas.microsoft.com/office/drawing/2010/main" val="0"/>
+              </a:ext>
+            </a:extLst>
+          </a:blip>
+          <a:stretch>
+            <a:fillRect/>
+          </a:stretch>
+        </p:blipFill>
+        <p:spPr>
+          <a:xfrm>
+            <a:off x="5386272" y="4551292"/>
+            <a:ext cx="1280160" cy="1280160"/>
+          </a:xfrm>
+          <a:prstGeom prst="rect">
+            <a:avLst/>
+          </a:prstGeom>
+        </p:spPr>
+      </p:pic>
+      <p:pic>
+        <p:nvPicPr>
+          <p:cNvPr id="15" name="Picture 14"/>
+          <p:cNvPicPr>
+            <a:picLocks noChangeAspect="1"/>
           </p:cNvPicPr>
           <p:nvPr/>
         </p:nvPicPr>
@@ -9233,7 +9351,7 @@
         </p:blipFill>
         <p:spPr>
           <a:xfrm>
-            <a:off x="5386272" y="4551292"/>
+            <a:off x="6504772" y="2237645"/>
             <a:ext cx="1280160" cy="1280160"/>
           </a:xfrm>
           <a:prstGeom prst="rect">
@@ -9243,7 +9361,7 @@
       </p:pic>
       <p:pic>
         <p:nvPicPr>
-          <p:cNvPr id="15" name="Picture 14"/>
+          <p:cNvPr id="16" name="Picture 15"/>
           <p:cNvPicPr>
             <a:picLocks noChangeAspect="1"/>
           </p:cNvPicPr>
@@ -9263,7 +9381,7 @@
         </p:blipFill>
         <p:spPr>
           <a:xfrm>
-            <a:off x="6504772" y="2237645"/>
+            <a:off x="4526602" y="2225453"/>
             <a:ext cx="1280160" cy="1280160"/>
           </a:xfrm>
           <a:prstGeom prst="rect">
@@ -9273,7 +9391,7 @@
       </p:pic>
       <p:pic>
         <p:nvPicPr>
-          <p:cNvPr id="16" name="Picture 15"/>
+          <p:cNvPr id="17" name="Picture 16"/>
           <p:cNvPicPr>
             <a:picLocks noChangeAspect="1"/>
           </p:cNvPicPr>
@@ -9293,37 +9411,7 @@
         </p:blipFill>
         <p:spPr>
           <a:xfrm>
-            <a:off x="4514410" y="2237645"/>
-            <a:ext cx="1280160" cy="1280160"/>
-          </a:xfrm>
-          <a:prstGeom prst="rect">
-            <a:avLst/>
-          </a:prstGeom>
-        </p:spPr>
-      </p:pic>
-      <p:pic>
-        <p:nvPicPr>
-          <p:cNvPr id="17" name="Picture 16"/>
-          <p:cNvPicPr>
-            <a:picLocks noChangeAspect="1"/>
-          </p:cNvPicPr>
-          <p:nvPr/>
-        </p:nvPicPr>
-        <p:blipFill>
-          <a:blip r:embed="rId9">
-            <a:extLst>
-              <a:ext uri="{28A0092B-C50C-407E-A947-70E740481C1C}">
-                <a14:useLocalDpi xmlns:a14="http://schemas.microsoft.com/office/drawing/2010/main" val="0"/>
-              </a:ext>
-            </a:extLst>
-          </a:blip>
-          <a:stretch>
-            <a:fillRect/>
-          </a:stretch>
-        </p:blipFill>
-        <p:spPr>
-          <a:xfrm>
-            <a:off x="8557342" y="2237645"/>
+            <a:off x="8557342" y="2213261"/>
             <a:ext cx="1280160" cy="1280160"/>
           </a:xfrm>
           <a:prstGeom prst="rect">
@@ -9340,7 +9428,7 @@
           <p:nvPr/>
         </p:nvPicPr>
         <p:blipFill rotWithShape="1">
-          <a:blip r:embed="rId10">
+          <a:blip r:embed="rId9">
             <a:extLst>
               <a:ext uri="{28A0092B-C50C-407E-A947-70E740481C1C}">
                 <a14:useLocalDpi xmlns:a14="http://schemas.microsoft.com/office/drawing/2010/main" val="0"/>
@@ -9352,7 +9440,7 @@
         </p:blipFill>
         <p:spPr>
           <a:xfrm>
-            <a:off x="2337511" y="2237645"/>
+            <a:off x="2325319" y="2237645"/>
             <a:ext cx="1298012" cy="1273418"/>
           </a:xfrm>
           <a:prstGeom prst="rect">
@@ -9383,6 +9471,30 @@
           </a:p>
         </p:txBody>
       </p:sp>
+      <p:pic>
+        <p:nvPicPr>
+          <p:cNvPr id="3" name="Picture 2"/>
+          <p:cNvPicPr>
+            <a:picLocks noChangeAspect="1"/>
+          </p:cNvPicPr>
+          <p:nvPr/>
+        </p:nvPicPr>
+        <p:blipFill>
+          <a:blip r:embed="rId10"/>
+          <a:stretch>
+            <a:fillRect/>
+          </a:stretch>
+        </p:blipFill>
+        <p:spPr>
+          <a:xfrm>
+            <a:off x="10625122" y="2235333"/>
+            <a:ext cx="1282472" cy="1282472"/>
+          </a:xfrm>
+          <a:prstGeom prst="rect">
+            <a:avLst/>
+          </a:prstGeom>
+        </p:spPr>
+      </p:pic>
     </p:spTree>
     <p:extLst>
       <p:ext uri="{BB962C8B-B14F-4D97-AF65-F5344CB8AC3E}">
@@ -10236,7 +10348,7 @@
               <a:rPr lang="en-US" altLang="zh-CN" sz="2400" dirty="0">
                 <a:solidFill>
                   <a:schemeClr val="bg1">
-                    <a:lumMod val="75000"/>
+                    <a:lumMod val="50000"/>
                   </a:schemeClr>
                 </a:solidFill>
               </a:rPr>
@@ -10246,7 +10358,7 @@
               <a:rPr lang="zh-CN" altLang="en-US" sz="2400" dirty="0">
                 <a:solidFill>
                   <a:schemeClr val="bg1">
-                    <a:lumMod val="75000"/>
+                    <a:lumMod val="50000"/>
                   </a:schemeClr>
                 </a:solidFill>
               </a:rPr>
@@ -10256,7 +10368,7 @@
               <a:rPr lang="en-US" altLang="zh-CN" sz="2400" dirty="0">
                 <a:solidFill>
                   <a:schemeClr val="bg1">
-                    <a:lumMod val="75000"/>
+                    <a:lumMod val="50000"/>
                   </a:schemeClr>
                 </a:solidFill>
               </a:rPr>
@@ -10265,7 +10377,7 @@
             <a:endParaRPr lang="en-US" sz="2400" dirty="0">
               <a:solidFill>
                 <a:schemeClr val="bg1">
-                  <a:lumMod val="75000"/>
+                  <a:lumMod val="50000"/>
                 </a:schemeClr>
               </a:solidFill>
             </a:endParaRPr>
@@ -10296,34 +10408,18 @@
           <a:p>
             <a:pPr algn="ctr"/>
             <a:r>
-              <a:rPr lang="en-US" altLang="zh-CN" sz="2400" dirty="0">
-                <a:solidFill>
-                  <a:srgbClr val="0A264B"/>
-                </a:solidFill>
-              </a:rPr>
+              <a:rPr lang="en-US" altLang="zh-CN" sz="2400" dirty="0"/>
               <a:t>Predictive</a:t>
             </a:r>
             <a:r>
-              <a:rPr lang="zh-CN" altLang="en-US" sz="2400" dirty="0">
-                <a:solidFill>
-                  <a:srgbClr val="0A264B"/>
-                </a:solidFill>
-              </a:rPr>
+              <a:rPr lang="zh-CN" altLang="en-US" sz="2400" dirty="0"/>
               <a:t> </a:t>
             </a:r>
             <a:r>
-              <a:rPr lang="en-US" altLang="zh-CN" sz="2400" dirty="0">
-                <a:solidFill>
-                  <a:srgbClr val="0A264B"/>
-                </a:solidFill>
-              </a:rPr>
+              <a:rPr lang="en-US" altLang="zh-CN" sz="2400" dirty="0"/>
               <a:t>Analysis</a:t>
             </a:r>
-            <a:endParaRPr lang="en-US" sz="2400" dirty="0">
-              <a:solidFill>
-                <a:srgbClr val="0A264B"/>
-              </a:solidFill>
-            </a:endParaRPr>
+            <a:endParaRPr lang="en-US" sz="2400" dirty="0"/>
           </a:p>
         </p:txBody>
       </p:sp>
@@ -11364,7 +11460,7 @@
           <p:nvPr/>
         </p:nvPicPr>
         <p:blipFill rotWithShape="1">
-          <a:blip r:embed="rId2">
+          <a:blip r:embed="rId3">
             <a:extLst>
               <a:ext uri="{28A0092B-C50C-407E-A947-70E740481C1C}">
                 <a14:useLocalDpi xmlns:a14="http://schemas.microsoft.com/office/drawing/2010/main" val="0"/>
@@ -11426,7 +11522,7 @@
           <p:nvPr/>
         </p:nvPicPr>
         <p:blipFill rotWithShape="1">
-          <a:blip r:embed="rId3">
+          <a:blip r:embed="rId4">
             <a:extLst>
               <a:ext uri="{28A0092B-C50C-407E-A947-70E740481C1C}">
                 <a14:useLocalDpi xmlns:a14="http://schemas.microsoft.com/office/drawing/2010/main" val="0"/>
@@ -13223,7 +13319,7 @@
             </a:lvl9pPr>
           </a:lstStyle>
           <a:p>
-            <a:pPr defTabSz="877712"/>
+            <a:pPr algn="ctr" defTabSz="877712"/>
             <a:r>
               <a:rPr lang="en-IN" sz="2000" kern="0" dirty="0">
                 <a:latin typeface="+mn-lt"/>
@@ -13249,7 +13345,9 @@
               <a:t> </a:t>
             </a:r>
             <a:r>
-              <a:rPr lang="en-US" sz="2000" kern="0" dirty="0"/>
+              <a:rPr lang="en-US" sz="2000" kern="0" dirty="0">
+                <a:latin typeface="+mn-lt"/>
+              </a:rPr>
               <a:t>allocate resources effectively when tackling violent crimes</a:t>
             </a:r>
           </a:p>
@@ -13800,7 +13898,7 @@
           </a:bodyPr>
           <a:lstStyle/>
           <a:p>
-            <a:pPr lvl="0" defTabSz="800100">
+            <a:pPr lvl="0" algn="ctr" defTabSz="800100">
               <a:lnSpc>
                 <a:spcPct val="90000"/>
               </a:lnSpc>
@@ -13847,7 +13945,7 @@
           </a:bodyPr>
           <a:lstStyle/>
           <a:p>
-            <a:pPr lvl="0" defTabSz="800100">
+            <a:pPr lvl="0" algn="ctr" defTabSz="800100">
               <a:lnSpc>
                 <a:spcPct val="90000"/>
               </a:lnSpc>
@@ -13891,7 +13989,7 @@
           </a:bodyPr>
           <a:lstStyle/>
           <a:p>
-            <a:pPr lvl="0" defTabSz="800100">
+            <a:pPr lvl="0" algn="ctr" defTabSz="800100">
               <a:lnSpc>
                 <a:spcPct val="90000"/>
               </a:lnSpc>
@@ -13935,7 +14033,7 @@
           </a:bodyPr>
           <a:lstStyle/>
           <a:p>
-            <a:pPr lvl="0" defTabSz="800100">
+            <a:pPr lvl="0" algn="ctr" defTabSz="800100">
               <a:lnSpc>
                 <a:spcPct val="90000"/>
               </a:lnSpc>
@@ -13999,7 +14097,7 @@
           </a:bodyPr>
           <a:lstStyle/>
           <a:p>
-            <a:pPr lvl="0" defTabSz="800100">
+            <a:pPr lvl="0" algn="ctr" defTabSz="800100">
               <a:lnSpc>
                 <a:spcPct val="90000"/>
               </a:lnSpc>
@@ -14401,11 +14499,26 @@
             </a:lvl1pPr>
           </a:lstStyle>
           <a:p>
-            <a:r>
-              <a:rPr lang="en-US" sz="2000" b="1" dirty="0"/>
+            <a:pPr algn="ctr"/>
+            <a:r>
+              <a:rPr lang="en-US" sz="2000" b="1" spc="-50" dirty="0">
+                <a:solidFill>
+                  <a:schemeClr val="tx1">
+                    <a:lumMod val="75000"/>
+                    <a:lumOff val="25000"/>
+                  </a:schemeClr>
+                </a:solidFill>
+              </a:rPr>
               <a:t>Quality of life issues as indicators of violent crime</a:t>
             </a:r>
-            <a:endParaRPr lang="en-IN" sz="2000" b="1" dirty="0"/>
+            <a:endParaRPr lang="en-IN" sz="2000" b="1" spc="-50" dirty="0">
+              <a:solidFill>
+                <a:schemeClr val="tx1">
+                  <a:lumMod val="75000"/>
+                  <a:lumOff val="25000"/>
+                </a:schemeClr>
+              </a:solidFill>
+            </a:endParaRPr>
           </a:p>
         </p:txBody>
       </p:sp>
@@ -14557,38 +14670,6 @@
                 </a:solidFill>
               </a:rPr>
               <a:t>TOOLS</a:t>
-            </a:r>
-            <a:r>
-              <a:rPr lang="zh-CN" altLang="en-US" sz="3600" dirty="0">
-                <a:solidFill>
-                  <a:schemeClr val="bg1"/>
-                </a:solidFill>
-              </a:rPr>
-              <a:t> </a:t>
-            </a:r>
-            <a:r>
-              <a:rPr lang="en-US" altLang="zh-CN" sz="3600" dirty="0">
-                <a:solidFill>
-                  <a:schemeClr val="bg1"/>
-                </a:solidFill>
-              </a:rPr>
-              <a:t>AND</a:t>
-            </a:r>
-            <a:r>
-              <a:rPr lang="zh-CN" altLang="en-US" sz="3600" dirty="0">
-                <a:solidFill>
-                  <a:schemeClr val="bg1"/>
-                </a:solidFill>
-              </a:rPr>
-              <a:t> </a:t>
-            </a:r>
-            <a:r>
-              <a:rPr lang="en-US" altLang="zh-CN" sz="3600" dirty="0">
-                <a:solidFill>
-                  <a:schemeClr val="bg1"/>
-                </a:solidFill>
-              </a:rPr>
-              <a:t>TECHNIQUES</a:t>
             </a:r>
             <a:endParaRPr lang="en-US" sz="3600" dirty="0">
               <a:solidFill>
@@ -16574,20 +16655,20 @@
               </a:spcAft>
               <a:buClrTx/>
               <a:buSzTx/>
-              <a:buFont typeface="Wingdings" charset="2"/>
-              <a:buChar char="ü"/>
+              <a:buFont typeface="Wingdings" panose="05000000000000000000" pitchFamily="2" charset="2"/>
+              <a:buChar char="q"/>
               <a:tabLst/>
               <a:defRPr/>
             </a:pPr>
             <a:r>
-              <a:rPr lang="en-US" altLang="zh-CN" dirty="0">
+              <a:rPr lang="en-US" altLang="zh-CN" i="1" dirty="0">
                 <a:solidFill>
                   <a:schemeClr val="bg1">
-                    <a:lumMod val="75000"/>
+                    <a:lumMod val="65000"/>
                   </a:schemeClr>
                 </a:solidFill>
               </a:rPr>
-              <a:t> ?</a:t>
+              <a:t> To be implemented..</a:t>
             </a:r>
           </a:p>
         </p:txBody>
@@ -18150,7 +18231,7 @@
         <p:spPr>
           <a:xfrm>
             <a:off x="5164784" y="4405121"/>
-            <a:ext cx="3188903" cy="338554"/>
+            <a:ext cx="3188903" cy="307777"/>
           </a:xfrm>
           <a:prstGeom prst="rect">
             <a:avLst/>
@@ -18165,18 +18246,26 @@
           <a:p>
             <a:pPr algn="ctr"/>
             <a:r>
-              <a:rPr lang="en-US" altLang="zh-CN" sz="1600" dirty="0"/>
-              <a:t>#violent</a:t>
-            </a:r>
-            <a:r>
-              <a:rPr lang="zh-CN" altLang="en-US" sz="1600" dirty="0"/>
+              <a:rPr lang="en-US" altLang="zh-CN" sz="1400" dirty="0">
+                <a:latin typeface="+mj-lt"/>
+              </a:rPr>
+              <a:t># Violent</a:t>
+            </a:r>
+            <a:r>
+              <a:rPr lang="zh-CN" altLang="en-US" sz="1400" dirty="0">
+                <a:latin typeface="+mj-lt"/>
+              </a:rPr>
               <a:t> </a:t>
             </a:r>
             <a:r>
-              <a:rPr lang="en-US" altLang="zh-CN" sz="1600" dirty="0"/>
-              <a:t>crime</a:t>
-            </a:r>
-            <a:endParaRPr lang="en-US" sz="1600" dirty="0"/>
+              <a:rPr lang="en-US" altLang="zh-CN" sz="1400" dirty="0">
+                <a:latin typeface="+mj-lt"/>
+              </a:rPr>
+              <a:t>Crime</a:t>
+            </a:r>
+            <a:endParaRPr lang="en-US" sz="1400" dirty="0">
+              <a:latin typeface="+mj-lt"/>
+            </a:endParaRPr>
           </a:p>
         </p:txBody>
       </p:sp>

</xml_diff>

<commit_message>
Updated Next steps / change log in notes
</commit_message>
<xml_diff>
--- a/Presentation/NOLA_Midterm_Presentation_v1.2.pptx
+++ b/Presentation/NOLA_Midterm_Presentation_v1.2.pptx
@@ -144,6 +144,13 @@
   <p:cmAuthor id="2" name="gqf0101@gmail.com" initials="g [2]" lastIdx="0" clrIdx="1">
     <p:extLst/>
   </p:cmAuthor>
+  <p:cmAuthor id="3" name="Nikhil" initials="N" lastIdx="1" clrIdx="2">
+    <p:extLst>
+      <p:ext uri="{19B8F6BF-5375-455C-9EA6-DF929625EA0E}">
+        <p15:presenceInfo xmlns:p15="http://schemas.microsoft.com/office/powerpoint/2012/main" userId="Nikhil" providerId="None"/>
+      </p:ext>
+    </p:extLst>
+  </p:cmAuthor>
 </p:cmAuthorLst>
 </file>
 
@@ -541,8 +548,12 @@
           <a:lstStyle/>
           <a:p>
             <a:r>
+              <a:rPr lang="en-US" dirty="0" err="1"/>
+              <a:t>Chnaged</a:t>
+            </a:r>
+            <a:r>
               <a:rPr lang="en-US" dirty="0"/>
-              <a:t>Date !!!!</a:t>
+              <a:t>: Added Date - Nikhil</a:t>
             </a:r>
             <a:endParaRPr lang="en-IN" dirty="0"/>
           </a:p>
@@ -630,15 +641,19 @@
           <a:p>
             <a:r>
               <a:rPr lang="en-US" dirty="0"/>
-              <a:t>Mention key findings next to</a:t>
+              <a:t>Increase</a:t>
             </a:r>
             <a:r>
               <a:rPr lang="en-US" baseline="0" dirty="0"/>
-              <a:t> graphs for SNS and  </a:t>
-            </a:r>
-            <a:r>
-              <a:rPr lang="en-US" baseline="0" dirty="0" err="1"/>
-              <a:t>QoL</a:t>
+              <a:t> size of table on the right &amp; </a:t>
+            </a:r>
+            <a:r>
+              <a:rPr lang="en-US" b="1" baseline="0" dirty="0"/>
+              <a:t>HIGHLIGHT</a:t>
+            </a:r>
+            <a:r>
+              <a:rPr lang="en-US" baseline="0" dirty="0"/>
+              <a:t> GRAND TOTAL </a:t>
             </a:r>
             <a:endParaRPr lang="en-IN" dirty="0"/>
           </a:p>
@@ -661,7 +676,7 @@
           <a:p>
             <a:fld id="{17221C13-30DA-4E71-8DF4-961BA98FF8DA}" type="slidenum">
               <a:rPr lang="en-US" smtClean="0"/>
-              <a:t>12</a:t>
+              <a:t>10</a:t>
             </a:fld>
             <a:endParaRPr lang="en-US"/>
           </a:p>
@@ -670,7 +685,7 @@
     </p:spTree>
     <p:extLst>
       <p:ext uri="{BB962C8B-B14F-4D97-AF65-F5344CB8AC3E}">
-        <p14:creationId xmlns:p14="http://schemas.microsoft.com/office/powerpoint/2010/main" val="4187516779"/>
+        <p14:creationId xmlns:p14="http://schemas.microsoft.com/office/powerpoint/2010/main" val="3809188947"/>
       </p:ext>
     </p:extLst>
   </p:cSld>
@@ -724,6 +739,18 @@
           <a:bodyPr/>
           <a:lstStyle/>
           <a:p>
+            <a:r>
+              <a:rPr lang="en-US" dirty="0"/>
+              <a:t>Mention key findings next to</a:t>
+            </a:r>
+            <a:r>
+              <a:rPr lang="en-US" baseline="0" dirty="0"/>
+              <a:t> graphs for SNS and  </a:t>
+            </a:r>
+            <a:r>
+              <a:rPr lang="en-US" baseline="0" dirty="0" err="1"/>
+              <a:t>QoL</a:t>
+            </a:r>
             <a:endParaRPr lang="en-IN" dirty="0"/>
           </a:p>
         </p:txBody>
@@ -745,7 +772,7 @@
           <a:p>
             <a:fld id="{17221C13-30DA-4E71-8DF4-961BA98FF8DA}" type="slidenum">
               <a:rPr lang="en-US" smtClean="0"/>
-              <a:t>14</a:t>
+              <a:t>11</a:t>
             </a:fld>
             <a:endParaRPr lang="en-US"/>
           </a:p>
@@ -754,7 +781,7 @@
     </p:spTree>
     <p:extLst>
       <p:ext uri="{BB962C8B-B14F-4D97-AF65-F5344CB8AC3E}">
-        <p14:creationId xmlns:p14="http://schemas.microsoft.com/office/powerpoint/2010/main" val="3958975437"/>
+        <p14:creationId xmlns:p14="http://schemas.microsoft.com/office/powerpoint/2010/main" val="2157850953"/>
       </p:ext>
     </p:extLst>
   </p:cSld>
@@ -810,7 +837,15 @@
           <a:p>
             <a:r>
               <a:rPr lang="en-US" dirty="0"/>
-              <a:t>Highlight results</a:t>
+              <a:t>Mention key findings next to</a:t>
+            </a:r>
+            <a:r>
+              <a:rPr lang="en-US" baseline="0" dirty="0"/>
+              <a:t> graphs for SNS and  </a:t>
+            </a:r>
+            <a:r>
+              <a:rPr lang="en-US" baseline="0" dirty="0" err="1"/>
+              <a:t>QoL</a:t>
             </a:r>
             <a:endParaRPr lang="en-IN" dirty="0"/>
           </a:p>
@@ -833,7 +868,7 @@
           <a:p>
             <a:fld id="{17221C13-30DA-4E71-8DF4-961BA98FF8DA}" type="slidenum">
               <a:rPr lang="en-US" smtClean="0"/>
-              <a:t>15</a:t>
+              <a:t>12</a:t>
             </a:fld>
             <a:endParaRPr lang="en-US"/>
           </a:p>
@@ -842,7 +877,7 @@
     </p:spTree>
     <p:extLst>
       <p:ext uri="{BB962C8B-B14F-4D97-AF65-F5344CB8AC3E}">
-        <p14:creationId xmlns:p14="http://schemas.microsoft.com/office/powerpoint/2010/main" val="281821263"/>
+        <p14:creationId xmlns:p14="http://schemas.microsoft.com/office/powerpoint/2010/main" val="4187516779"/>
       </p:ext>
     </p:extLst>
   </p:cSld>
@@ -917,7 +952,7 @@
           <a:p>
             <a:fld id="{17221C13-30DA-4E71-8DF4-961BA98FF8DA}" type="slidenum">
               <a:rPr lang="en-US" smtClean="0"/>
-              <a:t>16</a:t>
+              <a:t>14</a:t>
             </a:fld>
             <a:endParaRPr lang="en-US"/>
           </a:p>
@@ -926,7 +961,7 @@
     </p:spTree>
     <p:extLst>
       <p:ext uri="{BB962C8B-B14F-4D97-AF65-F5344CB8AC3E}">
-        <p14:creationId xmlns:p14="http://schemas.microsoft.com/office/powerpoint/2010/main" val="822788397"/>
+        <p14:creationId xmlns:p14="http://schemas.microsoft.com/office/powerpoint/2010/main" val="3958975437"/>
       </p:ext>
     </p:extLst>
   </p:cSld>
@@ -980,200 +1015,6 @@
           <a:bodyPr/>
           <a:lstStyle/>
           <a:p>
-            <a:pPr marL="0" marR="0" lvl="0" indent="0" algn="l" defTabSz="914400" rtl="0" eaLnBrk="1" fontAlgn="auto" latinLnBrk="0" hangingPunct="1">
-              <a:lnSpc>
-                <a:spcPct val="100000"/>
-              </a:lnSpc>
-              <a:spcBef>
-                <a:spcPts val="0"/>
-              </a:spcBef>
-              <a:spcAft>
-                <a:spcPts val="0"/>
-              </a:spcAft>
-              <a:buClrTx/>
-              <a:buSzTx/>
-              <a:buFontTx/>
-              <a:buNone/>
-              <a:tabLst/>
-              <a:defRPr/>
-            </a:pPr>
-            <a:r>
-              <a:rPr lang="en-US" dirty="0"/>
-              <a:t>Limited Data – as we have one in on granular</a:t>
-            </a:r>
-            <a:r>
-              <a:rPr lang="en-US" baseline="0" dirty="0"/>
-              <a:t> level of beats, we might be having large SE</a:t>
-            </a:r>
-            <a:endParaRPr lang="en-IN" dirty="0"/>
-          </a:p>
-          <a:p>
-            <a:endParaRPr lang="en-US" dirty="0"/>
-          </a:p>
-          <a:p>
-            <a:endParaRPr lang="en-US" dirty="0"/>
-          </a:p>
-          <a:p>
-            <a:pPr marL="0" marR="0" lvl="0" indent="0" algn="l" defTabSz="914400" rtl="0" eaLnBrk="1" fontAlgn="auto" latinLnBrk="0" hangingPunct="1">
-              <a:lnSpc>
-                <a:spcPct val="100000"/>
-              </a:lnSpc>
-              <a:spcBef>
-                <a:spcPts val="0"/>
-              </a:spcBef>
-              <a:spcAft>
-                <a:spcPts val="0"/>
-              </a:spcAft>
-              <a:buClrTx/>
-              <a:buSzTx/>
-              <a:buFontTx/>
-              <a:buNone/>
-              <a:tabLst/>
-              <a:defRPr/>
-            </a:pPr>
-            <a:r>
-              <a:rPr lang="en-US" altLang="zh-CN" sz="1200" dirty="0">
-                <a:solidFill>
-                  <a:schemeClr val="bg1"/>
-                </a:solidFill>
-              </a:rPr>
-              <a:t>Insufficient</a:t>
-            </a:r>
-            <a:r>
-              <a:rPr lang="zh-CN" altLang="en-US" sz="1200" dirty="0">
-                <a:solidFill>
-                  <a:schemeClr val="bg1"/>
-                </a:solidFill>
-              </a:rPr>
-              <a:t> </a:t>
-            </a:r>
-            <a:r>
-              <a:rPr lang="en-US" altLang="zh-CN" sz="1200" dirty="0">
-                <a:solidFill>
-                  <a:schemeClr val="bg1"/>
-                </a:solidFill>
-              </a:rPr>
-              <a:t>beat</a:t>
-            </a:r>
-            <a:r>
-              <a:rPr lang="zh-CN" altLang="en-US" sz="1200" dirty="0">
-                <a:solidFill>
-                  <a:schemeClr val="bg1"/>
-                </a:solidFill>
-              </a:rPr>
-              <a:t> </a:t>
-            </a:r>
-            <a:r>
-              <a:rPr lang="en-US" altLang="zh-CN" sz="1200" dirty="0">
-                <a:solidFill>
-                  <a:schemeClr val="bg1"/>
-                </a:solidFill>
-              </a:rPr>
-              <a:t>data</a:t>
-            </a:r>
-            <a:r>
-              <a:rPr lang="zh-CN" altLang="en-US" sz="1200" dirty="0">
-                <a:solidFill>
-                  <a:schemeClr val="bg1"/>
-                </a:solidFill>
-              </a:rPr>
-              <a:t> </a:t>
-            </a:r>
-            <a:r>
-              <a:rPr lang="en-US" altLang="zh-CN" sz="1200" dirty="0">
-                <a:solidFill>
-                  <a:schemeClr val="bg1"/>
-                </a:solidFill>
-              </a:rPr>
-              <a:t>for</a:t>
-            </a:r>
-            <a:r>
-              <a:rPr lang="zh-CN" altLang="en-US" sz="1200" dirty="0">
-                <a:solidFill>
-                  <a:schemeClr val="bg1"/>
-                </a:solidFill>
-              </a:rPr>
-              <a:t> </a:t>
-            </a:r>
-            <a:r>
-              <a:rPr lang="en-US" altLang="zh-CN" sz="1200" dirty="0">
-                <a:solidFill>
-                  <a:schemeClr val="bg1"/>
-                </a:solidFill>
-              </a:rPr>
-              <a:t>low</a:t>
-            </a:r>
-            <a:r>
-              <a:rPr lang="zh-CN" altLang="en-US" sz="1200" dirty="0">
-                <a:solidFill>
-                  <a:schemeClr val="bg1"/>
-                </a:solidFill>
-              </a:rPr>
-              <a:t> </a:t>
-            </a:r>
-            <a:r>
-              <a:rPr lang="en-US" altLang="zh-CN" sz="1200" dirty="0">
-                <a:solidFill>
-                  <a:schemeClr val="bg1"/>
-                </a:solidFill>
-              </a:rPr>
-              <a:t>level</a:t>
-            </a:r>
-            <a:r>
-              <a:rPr lang="zh-CN" altLang="en-US" sz="1200" dirty="0">
-                <a:solidFill>
-                  <a:schemeClr val="bg1"/>
-                </a:solidFill>
-              </a:rPr>
-              <a:t> </a:t>
-            </a:r>
-            <a:r>
-              <a:rPr lang="en-US" altLang="zh-CN" sz="1200" dirty="0">
-                <a:solidFill>
-                  <a:schemeClr val="bg1"/>
-                </a:solidFill>
-              </a:rPr>
-              <a:t>location</a:t>
-            </a:r>
-            <a:r>
-              <a:rPr lang="zh-CN" altLang="en-US" sz="1200" dirty="0">
-                <a:solidFill>
-                  <a:schemeClr val="bg1"/>
-                </a:solidFill>
-              </a:rPr>
-              <a:t> </a:t>
-            </a:r>
-            <a:r>
-              <a:rPr lang="en-US" altLang="zh-CN" sz="1200" dirty="0">
-                <a:solidFill>
-                  <a:schemeClr val="bg1"/>
-                </a:solidFill>
-              </a:rPr>
-              <a:t>based</a:t>
-            </a:r>
-            <a:r>
-              <a:rPr lang="zh-CN" altLang="en-US" sz="1200" dirty="0">
-                <a:solidFill>
-                  <a:schemeClr val="bg1"/>
-                </a:solidFill>
-              </a:rPr>
-              <a:t> </a:t>
-            </a:r>
-            <a:r>
-              <a:rPr lang="en-US" altLang="zh-CN" sz="1200" dirty="0">
-                <a:solidFill>
-                  <a:schemeClr val="bg1"/>
-                </a:solidFill>
-              </a:rPr>
-              <a:t>analysis</a:t>
-            </a:r>
-            <a:endParaRPr lang="en-US" sz="1200" dirty="0">
-              <a:solidFill>
-                <a:schemeClr val="bg1"/>
-              </a:solidFill>
-            </a:endParaRPr>
-          </a:p>
-          <a:p>
             <a:endParaRPr lang="en-IN" dirty="0"/>
           </a:p>
         </p:txBody>
@@ -1195,7 +1036,7 @@
           <a:p>
             <a:fld id="{17221C13-30DA-4E71-8DF4-961BA98FF8DA}" type="slidenum">
               <a:rPr lang="en-US" smtClean="0"/>
-              <a:t>17</a:t>
+              <a:t>15</a:t>
             </a:fld>
             <a:endParaRPr lang="en-US"/>
           </a:p>
@@ -1204,7 +1045,7 @@
     </p:spTree>
     <p:extLst>
       <p:ext uri="{BB962C8B-B14F-4D97-AF65-F5344CB8AC3E}">
-        <p14:creationId xmlns:p14="http://schemas.microsoft.com/office/powerpoint/2010/main" val="2698421400"/>
+        <p14:creationId xmlns:p14="http://schemas.microsoft.com/office/powerpoint/2010/main" val="281821263"/>
       </p:ext>
     </p:extLst>
   </p:cSld>
@@ -1258,14 +1099,6 @@
           <a:bodyPr/>
           <a:lstStyle/>
           <a:p>
-            <a:r>
-              <a:rPr lang="en-US" dirty="0"/>
-              <a:t>Mention recommendations thus far such as improving data collection </a:t>
-            </a:r>
-            <a:r>
-              <a:rPr lang="en-US" dirty="0" err="1"/>
-              <a:t>etc</a:t>
-            </a:r>
             <a:endParaRPr lang="en-IN" dirty="0"/>
           </a:p>
         </p:txBody>
@@ -1287,7 +1120,7 @@
           <a:p>
             <a:fld id="{17221C13-30DA-4E71-8DF4-961BA98FF8DA}" type="slidenum">
               <a:rPr lang="en-US" smtClean="0"/>
-              <a:t>18</a:t>
+              <a:t>16</a:t>
             </a:fld>
             <a:endParaRPr lang="en-US"/>
           </a:p>
@@ -1296,7 +1129,7 @@
     </p:spTree>
     <p:extLst>
       <p:ext uri="{BB962C8B-B14F-4D97-AF65-F5344CB8AC3E}">
-        <p14:creationId xmlns:p14="http://schemas.microsoft.com/office/powerpoint/2010/main" val="2926241758"/>
+        <p14:creationId xmlns:p14="http://schemas.microsoft.com/office/powerpoint/2010/main" val="822788397"/>
       </p:ext>
     </p:extLst>
   </p:cSld>
@@ -1350,7 +1183,209 @@
           <a:bodyPr/>
           <a:lstStyle/>
           <a:p>
+            <a:pPr marL="0" marR="0" lvl="0" indent="0" algn="l" defTabSz="914400" rtl="0" eaLnBrk="1" fontAlgn="auto" latinLnBrk="0" hangingPunct="1">
+              <a:lnSpc>
+                <a:spcPct val="100000"/>
+              </a:lnSpc>
+              <a:spcBef>
+                <a:spcPts val="0"/>
+              </a:spcBef>
+              <a:spcAft>
+                <a:spcPts val="0"/>
+              </a:spcAft>
+              <a:buClrTx/>
+              <a:buSzTx/>
+              <a:buFontTx/>
+              <a:buNone/>
+              <a:tabLst/>
+              <a:defRPr/>
+            </a:pPr>
+            <a:r>
+              <a:rPr lang="en-US" dirty="0"/>
+              <a:t>Limited Data – as we have one in on granular</a:t>
+            </a:r>
+            <a:r>
+              <a:rPr lang="en-US" baseline="0" dirty="0"/>
+              <a:t> level of beats, we might be having large SE</a:t>
+            </a:r>
             <a:endParaRPr lang="en-IN" dirty="0"/>
+          </a:p>
+          <a:p>
+            <a:pPr marL="0" marR="0" lvl="0" indent="0" algn="l" defTabSz="914400" rtl="0" eaLnBrk="1" fontAlgn="auto" latinLnBrk="0" hangingPunct="1">
+              <a:lnSpc>
+                <a:spcPct val="100000"/>
+              </a:lnSpc>
+              <a:spcBef>
+                <a:spcPts val="0"/>
+              </a:spcBef>
+              <a:spcAft>
+                <a:spcPts val="0"/>
+              </a:spcAft>
+              <a:buClrTx/>
+              <a:buSzTx/>
+              <a:buFontTx/>
+              <a:buNone/>
+              <a:tabLst/>
+              <a:defRPr/>
+            </a:pPr>
+            <a:r>
+              <a:rPr lang="en-US" altLang="zh-CN" sz="1200" dirty="0">
+                <a:solidFill>
+                  <a:schemeClr val="bg1"/>
+                </a:solidFill>
+              </a:rPr>
+              <a:t>Insufficient</a:t>
+            </a:r>
+            <a:r>
+              <a:rPr lang="zh-CN" altLang="en-US" sz="1200" dirty="0">
+                <a:solidFill>
+                  <a:schemeClr val="bg1"/>
+                </a:solidFill>
+              </a:rPr>
+              <a:t> </a:t>
+            </a:r>
+            <a:r>
+              <a:rPr lang="en-US" altLang="zh-CN" sz="1200" dirty="0">
+                <a:solidFill>
+                  <a:schemeClr val="bg1"/>
+                </a:solidFill>
+              </a:rPr>
+              <a:t>beat</a:t>
+            </a:r>
+            <a:r>
+              <a:rPr lang="zh-CN" altLang="en-US" sz="1200" dirty="0">
+                <a:solidFill>
+                  <a:schemeClr val="bg1"/>
+                </a:solidFill>
+              </a:rPr>
+              <a:t> </a:t>
+            </a:r>
+            <a:r>
+              <a:rPr lang="en-US" altLang="zh-CN" sz="1200" dirty="0">
+                <a:solidFill>
+                  <a:schemeClr val="bg1"/>
+                </a:solidFill>
+              </a:rPr>
+              <a:t>data</a:t>
+            </a:r>
+            <a:r>
+              <a:rPr lang="zh-CN" altLang="en-US" sz="1200" dirty="0">
+                <a:solidFill>
+                  <a:schemeClr val="bg1"/>
+                </a:solidFill>
+              </a:rPr>
+              <a:t> </a:t>
+            </a:r>
+            <a:r>
+              <a:rPr lang="en-US" altLang="zh-CN" sz="1200" dirty="0">
+                <a:solidFill>
+                  <a:schemeClr val="bg1"/>
+                </a:solidFill>
+              </a:rPr>
+              <a:t>for</a:t>
+            </a:r>
+            <a:r>
+              <a:rPr lang="zh-CN" altLang="en-US" sz="1200" dirty="0">
+                <a:solidFill>
+                  <a:schemeClr val="bg1"/>
+                </a:solidFill>
+              </a:rPr>
+              <a:t> </a:t>
+            </a:r>
+            <a:r>
+              <a:rPr lang="en-US" altLang="zh-CN" sz="1200" dirty="0">
+                <a:solidFill>
+                  <a:schemeClr val="bg1"/>
+                </a:solidFill>
+              </a:rPr>
+              <a:t>low</a:t>
+            </a:r>
+            <a:r>
+              <a:rPr lang="zh-CN" altLang="en-US" sz="1200" dirty="0">
+                <a:solidFill>
+                  <a:schemeClr val="bg1"/>
+                </a:solidFill>
+              </a:rPr>
+              <a:t> </a:t>
+            </a:r>
+            <a:r>
+              <a:rPr lang="en-US" altLang="zh-CN" sz="1200" dirty="0">
+                <a:solidFill>
+                  <a:schemeClr val="bg1"/>
+                </a:solidFill>
+              </a:rPr>
+              <a:t>level</a:t>
+            </a:r>
+            <a:r>
+              <a:rPr lang="zh-CN" altLang="en-US" sz="1200" dirty="0">
+                <a:solidFill>
+                  <a:schemeClr val="bg1"/>
+                </a:solidFill>
+              </a:rPr>
+              <a:t> </a:t>
+            </a:r>
+            <a:r>
+              <a:rPr lang="en-US" altLang="zh-CN" sz="1200" dirty="0">
+                <a:solidFill>
+                  <a:schemeClr val="bg1"/>
+                </a:solidFill>
+              </a:rPr>
+              <a:t>location</a:t>
+            </a:r>
+            <a:r>
+              <a:rPr lang="zh-CN" altLang="en-US" sz="1200" dirty="0">
+                <a:solidFill>
+                  <a:schemeClr val="bg1"/>
+                </a:solidFill>
+              </a:rPr>
+              <a:t> </a:t>
+            </a:r>
+            <a:r>
+              <a:rPr lang="en-US" altLang="zh-CN" sz="1200" dirty="0">
+                <a:solidFill>
+                  <a:schemeClr val="bg1"/>
+                </a:solidFill>
+              </a:rPr>
+              <a:t>based</a:t>
+            </a:r>
+            <a:r>
+              <a:rPr lang="zh-CN" altLang="en-US" sz="1200" dirty="0">
+                <a:solidFill>
+                  <a:schemeClr val="bg1"/>
+                </a:solidFill>
+              </a:rPr>
+              <a:t> </a:t>
+            </a:r>
+            <a:r>
+              <a:rPr lang="en-US" altLang="zh-CN" sz="1200" dirty="0">
+                <a:solidFill>
+                  <a:schemeClr val="bg1"/>
+                </a:solidFill>
+              </a:rPr>
+              <a:t>analysis</a:t>
+            </a:r>
+            <a:endParaRPr lang="en-US" sz="1200" dirty="0">
+              <a:solidFill>
+                <a:schemeClr val="bg1"/>
+              </a:solidFill>
+            </a:endParaRPr>
+          </a:p>
+          <a:p>
+            <a:endParaRPr lang="en-IN" dirty="0"/>
+          </a:p>
+          <a:p>
+            <a:r>
+              <a:rPr lang="en-IN" dirty="0"/>
+              <a:t>Changed: Added 3</a:t>
+            </a:r>
+            <a:r>
+              <a:rPr lang="en-IN" baseline="30000" dirty="0"/>
+              <a:t>rd</a:t>
+            </a:r>
+            <a:r>
+              <a:rPr lang="en-IN" dirty="0"/>
+              <a:t> point -Nikhil</a:t>
+            </a:r>
           </a:p>
         </p:txBody>
       </p:sp>
@@ -1371,7 +1406,7 @@
           <a:p>
             <a:fld id="{17221C13-30DA-4E71-8DF4-961BA98FF8DA}" type="slidenum">
               <a:rPr lang="en-US" smtClean="0"/>
-              <a:t>20</a:t>
+              <a:t>17</a:t>
             </a:fld>
             <a:endParaRPr lang="en-US"/>
           </a:p>
@@ -1380,7 +1415,7 @@
     </p:spTree>
     <p:extLst>
       <p:ext uri="{BB962C8B-B14F-4D97-AF65-F5344CB8AC3E}">
-        <p14:creationId xmlns:p14="http://schemas.microsoft.com/office/powerpoint/2010/main" val="2832837980"/>
+        <p14:creationId xmlns:p14="http://schemas.microsoft.com/office/powerpoint/2010/main" val="2698421400"/>
       </p:ext>
     </p:extLst>
   </p:cSld>
@@ -1434,6 +1469,24 @@
           <a:bodyPr/>
           <a:lstStyle/>
           <a:p>
+            <a:r>
+              <a:rPr lang="en-US" dirty="0"/>
+              <a:t>Mention recommendations thus far such as improving data collection </a:t>
+            </a:r>
+            <a:r>
+              <a:rPr lang="en-US" dirty="0" err="1"/>
+              <a:t>etc</a:t>
+            </a:r>
+            <a:endParaRPr lang="en-US" dirty="0"/>
+          </a:p>
+          <a:p>
+            <a:endParaRPr lang="en-US" dirty="0"/>
+          </a:p>
+          <a:p>
+            <a:r>
+              <a:rPr lang="en-US" dirty="0"/>
+              <a:t>Changed: Added NOPD/CMU and #3</a:t>
+            </a:r>
             <a:endParaRPr lang="en-IN" dirty="0"/>
           </a:p>
         </p:txBody>
@@ -1455,7 +1508,7 @@
           <a:p>
             <a:fld id="{17221C13-30DA-4E71-8DF4-961BA98FF8DA}" type="slidenum">
               <a:rPr lang="en-US" smtClean="0"/>
-              <a:t>21</a:t>
+              <a:t>18</a:t>
             </a:fld>
             <a:endParaRPr lang="en-US"/>
           </a:p>
@@ -1464,7 +1517,7 @@
     </p:spTree>
     <p:extLst>
       <p:ext uri="{BB962C8B-B14F-4D97-AF65-F5344CB8AC3E}">
-        <p14:creationId xmlns:p14="http://schemas.microsoft.com/office/powerpoint/2010/main" val="2370076311"/>
+        <p14:creationId xmlns:p14="http://schemas.microsoft.com/office/powerpoint/2010/main" val="2926241758"/>
       </p:ext>
     </p:extLst>
   </p:cSld>
@@ -1518,13 +1571,127 @@
           <a:bodyPr/>
           <a:lstStyle/>
           <a:p>
-            <a:r>
-              <a:rPr lang="en-US" dirty="0"/>
-              <a:t>The image gets pixelated when viewed on </a:t>
-            </a:r>
-            <a:r>
-              <a:rPr lang="en-US"/>
-              <a:t>large screen</a:t>
+            <a:pPr marL="0" marR="0" lvl="0" indent="0" algn="l" defTabSz="914400" rtl="0" eaLnBrk="1" fontAlgn="auto" latinLnBrk="0" hangingPunct="1">
+              <a:lnSpc>
+                <a:spcPct val="100000"/>
+              </a:lnSpc>
+              <a:spcBef>
+                <a:spcPts val="0"/>
+              </a:spcBef>
+              <a:spcAft>
+                <a:spcPts val="0"/>
+              </a:spcAft>
+              <a:buClrTx/>
+              <a:buSzTx/>
+              <a:buFontTx/>
+              <a:buNone/>
+              <a:tabLst/>
+              <a:defRPr/>
+            </a:pPr>
+            <a:r>
+              <a:rPr lang="en-IN" dirty="0"/>
+              <a:t>Changed: 	</a:t>
+            </a:r>
+            <a:r>
+              <a:rPr lang="en-US" altLang="zh-CN" b="1" dirty="0"/>
+              <a:t>Build</a:t>
+            </a:r>
+            <a:r>
+              <a:rPr lang="zh-CN" altLang="en-US" b="1" dirty="0"/>
+              <a:t> </a:t>
+            </a:r>
+            <a:r>
+              <a:rPr lang="en-US" altLang="zh-CN" b="1" dirty="0"/>
+              <a:t>a</a:t>
+            </a:r>
+            <a:r>
+              <a:rPr lang="zh-CN" altLang="en-US" b="1" dirty="0"/>
+              <a:t> </a:t>
+            </a:r>
+            <a:r>
+              <a:rPr lang="en-US" altLang="zh-CN" b="1" dirty="0"/>
+              <a:t>predictive</a:t>
+            </a:r>
+            <a:r>
+              <a:rPr lang="zh-CN" altLang="en-US" b="1" dirty="0"/>
+              <a:t> </a:t>
+            </a:r>
+            <a:r>
+              <a:rPr lang="en-US" altLang="zh-CN" b="1" dirty="0"/>
+              <a:t>model</a:t>
+            </a:r>
+            <a:r>
+              <a:rPr lang="en-IN" dirty="0"/>
+              <a:t> to “RESULTS” (Results/Outcome)</a:t>
+            </a:r>
+          </a:p>
+          <a:p>
+            <a:pPr marL="0" marR="0" lvl="0" indent="0" algn="l" defTabSz="914400" rtl="0" eaLnBrk="1" fontAlgn="auto" latinLnBrk="0" hangingPunct="1">
+              <a:lnSpc>
+                <a:spcPct val="100000"/>
+              </a:lnSpc>
+              <a:spcBef>
+                <a:spcPts val="0"/>
+              </a:spcBef>
+              <a:spcAft>
+                <a:spcPts val="0"/>
+              </a:spcAft>
+              <a:buClrTx/>
+              <a:buSzTx/>
+              <a:buFontTx/>
+              <a:buNone/>
+              <a:tabLst/>
+              <a:defRPr/>
+            </a:pPr>
+            <a:r>
+              <a:rPr lang="en-IN" dirty="0"/>
+              <a:t>	Added content to Results </a:t>
+            </a:r>
+          </a:p>
+          <a:p>
+            <a:pPr marL="0" marR="0" lvl="0" indent="0" algn="l" defTabSz="914400" rtl="0" eaLnBrk="1" fontAlgn="auto" latinLnBrk="0" hangingPunct="1">
+              <a:lnSpc>
+                <a:spcPct val="100000"/>
+              </a:lnSpc>
+              <a:spcBef>
+                <a:spcPts val="0"/>
+              </a:spcBef>
+              <a:spcAft>
+                <a:spcPts val="0"/>
+              </a:spcAft>
+              <a:buClrTx/>
+              <a:buSzTx/>
+              <a:buFontTx/>
+              <a:buNone/>
+              <a:tabLst/>
+              <a:defRPr/>
+            </a:pPr>
+            <a:r>
+              <a:rPr lang="en-IN" dirty="0"/>
+              <a:t>	Highlighted Pred.. Analytics</a:t>
+            </a:r>
+          </a:p>
+          <a:p>
+            <a:pPr marL="0" marR="0" lvl="0" indent="0" algn="l" defTabSz="914400" rtl="0" eaLnBrk="1" fontAlgn="auto" latinLnBrk="0" hangingPunct="1">
+              <a:lnSpc>
+                <a:spcPct val="100000"/>
+              </a:lnSpc>
+              <a:spcBef>
+                <a:spcPts val="0"/>
+              </a:spcBef>
+              <a:spcAft>
+                <a:spcPts val="0"/>
+              </a:spcAft>
+              <a:buClrTx/>
+              <a:buSzTx/>
+              <a:buFontTx/>
+              <a:buNone/>
+              <a:tabLst/>
+              <a:defRPr/>
+            </a:pPr>
+            <a:r>
+              <a:rPr lang="en-IN" dirty="0"/>
+              <a:t>	-Nikhil</a:t>
             </a:r>
           </a:p>
         </p:txBody>
@@ -1546,7 +1713,7 @@
           <a:p>
             <a:fld id="{17221C13-30DA-4E71-8DF4-961BA98FF8DA}" type="slidenum">
               <a:rPr lang="en-US" smtClean="0"/>
-              <a:t>22</a:t>
+              <a:t>20</a:t>
             </a:fld>
             <a:endParaRPr lang="en-US"/>
           </a:p>
@@ -1555,7 +1722,94 @@
     </p:spTree>
     <p:extLst>
       <p:ext uri="{BB962C8B-B14F-4D97-AF65-F5344CB8AC3E}">
-        <p14:creationId xmlns:p14="http://schemas.microsoft.com/office/powerpoint/2010/main" val="2638144593"/>
+        <p14:creationId xmlns:p14="http://schemas.microsoft.com/office/powerpoint/2010/main" val="2832837980"/>
+      </p:ext>
+    </p:extLst>
+  </p:cSld>
+  <p:clrMapOvr>
+    <a:masterClrMapping/>
+  </p:clrMapOvr>
+</p:notes>
+</file>
+
+<file path=ppt/notesSlides/notesSlide19.xml><?xml version="1.0" encoding="utf-8"?>
+<p:notes xmlns:a="http://schemas.openxmlformats.org/drawingml/2006/main" xmlns:r="http://schemas.openxmlformats.org/officeDocument/2006/relationships" xmlns:p="http://schemas.openxmlformats.org/presentationml/2006/main">
+  <p:cSld>
+    <p:spTree>
+      <p:nvGrpSpPr>
+        <p:cNvPr id="1" name=""/>
+        <p:cNvGrpSpPr/>
+        <p:nvPr/>
+      </p:nvGrpSpPr>
+      <p:grpSpPr>
+        <a:xfrm>
+          <a:off x="0" y="0"/>
+          <a:ext cx="0" cy="0"/>
+          <a:chOff x="0" y="0"/>
+          <a:chExt cx="0" cy="0"/>
+        </a:xfrm>
+      </p:grpSpPr>
+      <p:sp>
+        <p:nvSpPr>
+          <p:cNvPr id="2" name="Slide Image Placeholder 1"/>
+          <p:cNvSpPr>
+            <a:spLocks noGrp="1" noRot="1" noChangeAspect="1"/>
+          </p:cNvSpPr>
+          <p:nvPr>
+            <p:ph type="sldImg"/>
+          </p:nvPr>
+        </p:nvSpPr>
+        <p:spPr/>
+      </p:sp>
+      <p:sp>
+        <p:nvSpPr>
+          <p:cNvPr id="3" name="Notes Placeholder 2"/>
+          <p:cNvSpPr>
+            <a:spLocks noGrp="1"/>
+          </p:cNvSpPr>
+          <p:nvPr>
+            <p:ph type="body" idx="1"/>
+          </p:nvPr>
+        </p:nvSpPr>
+        <p:spPr/>
+        <p:txBody>
+          <a:bodyPr/>
+          <a:lstStyle/>
+          <a:p>
+            <a:r>
+              <a:rPr lang="en-IN" dirty="0"/>
+              <a:t>Changed: Added content - Nikhil</a:t>
+            </a:r>
+          </a:p>
+        </p:txBody>
+      </p:sp>
+      <p:sp>
+        <p:nvSpPr>
+          <p:cNvPr id="4" name="Slide Number Placeholder 3"/>
+          <p:cNvSpPr>
+            <a:spLocks noGrp="1"/>
+          </p:cNvSpPr>
+          <p:nvPr>
+            <p:ph type="sldNum" sz="quarter" idx="10"/>
+          </p:nvPr>
+        </p:nvSpPr>
+        <p:spPr/>
+        <p:txBody>
+          <a:bodyPr/>
+          <a:lstStyle/>
+          <a:p>
+            <a:fld id="{17221C13-30DA-4E71-8DF4-961BA98FF8DA}" type="slidenum">
+              <a:rPr lang="en-US" smtClean="0"/>
+              <a:t>21</a:t>
+            </a:fld>
+            <a:endParaRPr lang="en-US"/>
+          </a:p>
+        </p:txBody>
+      </p:sp>
+    </p:spTree>
+    <p:extLst>
+      <p:ext uri="{BB962C8B-B14F-4D97-AF65-F5344CB8AC3E}">
+        <p14:creationId xmlns:p14="http://schemas.microsoft.com/office/powerpoint/2010/main" val="2370076311"/>
       </p:ext>
     </p:extLst>
   </p:cSld>
@@ -1609,7 +1863,10 @@
           <a:bodyPr/>
           <a:lstStyle/>
           <a:p>
-            <a:endParaRPr lang="en-US"/>
+            <a:r>
+              <a:rPr lang="en-US" dirty="0"/>
+              <a:t>Changed: Updated my image - Nikhil</a:t>
+            </a:r>
           </a:p>
         </p:txBody>
       </p:sp>
@@ -1640,6 +1897,93 @@
     <p:extLst>
       <p:ext uri="{BB962C8B-B14F-4D97-AF65-F5344CB8AC3E}">
         <p14:creationId xmlns:p14="http://schemas.microsoft.com/office/powerpoint/2010/main" val="1011905388"/>
+      </p:ext>
+    </p:extLst>
+  </p:cSld>
+  <p:clrMapOvr>
+    <a:masterClrMapping/>
+  </p:clrMapOvr>
+</p:notes>
+</file>
+
+<file path=ppt/notesSlides/notesSlide20.xml><?xml version="1.0" encoding="utf-8"?>
+<p:notes xmlns:a="http://schemas.openxmlformats.org/drawingml/2006/main" xmlns:r="http://schemas.openxmlformats.org/officeDocument/2006/relationships" xmlns:p="http://schemas.openxmlformats.org/presentationml/2006/main">
+  <p:cSld>
+    <p:spTree>
+      <p:nvGrpSpPr>
+        <p:cNvPr id="1" name=""/>
+        <p:cNvGrpSpPr/>
+        <p:nvPr/>
+      </p:nvGrpSpPr>
+      <p:grpSpPr>
+        <a:xfrm>
+          <a:off x="0" y="0"/>
+          <a:ext cx="0" cy="0"/>
+          <a:chOff x="0" y="0"/>
+          <a:chExt cx="0" cy="0"/>
+        </a:xfrm>
+      </p:grpSpPr>
+      <p:sp>
+        <p:nvSpPr>
+          <p:cNvPr id="2" name="Slide Image Placeholder 1"/>
+          <p:cNvSpPr>
+            <a:spLocks noGrp="1" noRot="1" noChangeAspect="1"/>
+          </p:cNvSpPr>
+          <p:nvPr>
+            <p:ph type="sldImg"/>
+          </p:nvPr>
+        </p:nvSpPr>
+        <p:spPr/>
+      </p:sp>
+      <p:sp>
+        <p:nvSpPr>
+          <p:cNvPr id="3" name="Notes Placeholder 2"/>
+          <p:cNvSpPr>
+            <a:spLocks noGrp="1"/>
+          </p:cNvSpPr>
+          <p:nvPr>
+            <p:ph type="body" idx="1"/>
+          </p:nvPr>
+        </p:nvSpPr>
+        <p:spPr/>
+        <p:txBody>
+          <a:bodyPr/>
+          <a:lstStyle/>
+          <a:p>
+            <a:r>
+              <a:rPr lang="en-US" dirty="0"/>
+              <a:t>The image gets pixelated when viewed on large screen</a:t>
+            </a:r>
+          </a:p>
+        </p:txBody>
+      </p:sp>
+      <p:sp>
+        <p:nvSpPr>
+          <p:cNvPr id="4" name="Slide Number Placeholder 3"/>
+          <p:cNvSpPr>
+            <a:spLocks noGrp="1"/>
+          </p:cNvSpPr>
+          <p:nvPr>
+            <p:ph type="sldNum" sz="quarter" idx="10"/>
+          </p:nvPr>
+        </p:nvSpPr>
+        <p:spPr/>
+        <p:txBody>
+          <a:bodyPr/>
+          <a:lstStyle/>
+          <a:p>
+            <a:fld id="{17221C13-30DA-4E71-8DF4-961BA98FF8DA}" type="slidenum">
+              <a:rPr lang="en-US" smtClean="0"/>
+              <a:t>22</a:t>
+            </a:fld>
+            <a:endParaRPr lang="en-US"/>
+          </a:p>
+        </p:txBody>
+      </p:sp>
+    </p:spTree>
+    <p:extLst>
+      <p:ext uri="{BB962C8B-B14F-4D97-AF65-F5344CB8AC3E}">
+        <p14:creationId xmlns:p14="http://schemas.microsoft.com/office/powerpoint/2010/main" val="2638144593"/>
       </p:ext>
     </p:extLst>
   </p:cSld>
@@ -1695,11 +2039,7 @@
           <a:p>
             <a:r>
               <a:rPr lang="en-US" dirty="0"/>
-              <a:t>Order names and </a:t>
-            </a:r>
-            <a:r>
-              <a:rPr lang="en-US" dirty="0" err="1"/>
-              <a:t>designatioons</a:t>
+              <a:t>Order names and designations</a:t>
             </a:r>
             <a:endParaRPr lang="en-IN" dirty="0"/>
           </a:p>
@@ -1787,9 +2127,78 @@
           <a:p>
             <a:r>
               <a:rPr lang="en-US" dirty="0"/>
-              <a:t>Reduce Fonts</a:t>
-            </a:r>
-            <a:endParaRPr lang="en-IN" dirty="0"/>
+              <a:t>Changed:         Text Color Blue -&gt; Gray -Nikhil</a:t>
+            </a:r>
+          </a:p>
+          <a:p>
+            <a:r>
+              <a:rPr lang="en-US" dirty="0"/>
+              <a:t>Changed: 	Project Introduction -&gt; Introduction</a:t>
+            </a:r>
+          </a:p>
+          <a:p>
+            <a:pPr marL="0" marR="0" lvl="0" indent="0" algn="l" defTabSz="914400" rtl="0" eaLnBrk="1" fontAlgn="auto" latinLnBrk="0" hangingPunct="1">
+              <a:lnSpc>
+                <a:spcPct val="100000"/>
+              </a:lnSpc>
+              <a:spcBef>
+                <a:spcPts val="0"/>
+              </a:spcBef>
+              <a:spcAft>
+                <a:spcPts val="0"/>
+              </a:spcAft>
+              <a:buClrTx/>
+              <a:buSzTx/>
+              <a:buFontTx/>
+              <a:buNone/>
+              <a:tabLst/>
+              <a:defRPr/>
+            </a:pPr>
+            <a:r>
+              <a:rPr lang="en-US" dirty="0"/>
+              <a:t>	</a:t>
+            </a:r>
+            <a:r>
+              <a:rPr lang="en-US" altLang="zh-CN" sz="1200" dirty="0">
+                <a:solidFill>
+                  <a:schemeClr val="bg1"/>
+                </a:solidFill>
+              </a:rPr>
+              <a:t>Methodology -&gt; Data Analysis</a:t>
+            </a:r>
+          </a:p>
+          <a:p>
+            <a:pPr marL="0" marR="0" lvl="0" indent="0" algn="l" defTabSz="914400" rtl="0" eaLnBrk="1" fontAlgn="auto" latinLnBrk="0" hangingPunct="1">
+              <a:lnSpc>
+                <a:spcPct val="100000"/>
+              </a:lnSpc>
+              <a:spcBef>
+                <a:spcPts val="0"/>
+              </a:spcBef>
+              <a:spcAft>
+                <a:spcPts val="0"/>
+              </a:spcAft>
+              <a:buClrTx/>
+              <a:buSzTx/>
+              <a:buFontTx/>
+              <a:buNone/>
+              <a:tabLst/>
+              <a:defRPr/>
+            </a:pPr>
+            <a:r>
+              <a:rPr lang="en-US" sz="1200" dirty="0">
+                <a:solidFill>
+                  <a:schemeClr val="bg1"/>
+                </a:solidFill>
+              </a:rPr>
+              <a:t>	Key Findings -&gt; Results </a:t>
+            </a:r>
+          </a:p>
+          <a:p>
+            <a:r>
+              <a:rPr lang="en-US" dirty="0"/>
+              <a:t>	- Nikhil</a:t>
+            </a:r>
           </a:p>
         </p:txBody>
       </p:sp>
@@ -1810,7 +2219,7 @@
           <a:p>
             <a:fld id="{17221C13-30DA-4E71-8DF4-961BA98FF8DA}" type="slidenum">
               <a:rPr lang="en-US" smtClean="0"/>
-              <a:t>5</a:t>
+              <a:t>4</a:t>
             </a:fld>
             <a:endParaRPr lang="en-US"/>
           </a:p>
@@ -1819,7 +2228,7 @@
     </p:spTree>
     <p:extLst>
       <p:ext uri="{BB962C8B-B14F-4D97-AF65-F5344CB8AC3E}">
-        <p14:creationId xmlns:p14="http://schemas.microsoft.com/office/powerpoint/2010/main" val="2053550664"/>
+        <p14:creationId xmlns:p14="http://schemas.microsoft.com/office/powerpoint/2010/main" val="1250559378"/>
       </p:ext>
     </p:extLst>
   </p:cSld>
@@ -1874,17 +2283,31 @@
           <a:lstStyle/>
           <a:p>
             <a:r>
-              <a:rPr lang="en-IN" dirty="0"/>
-              <a:t>Change arrows from bi direction to </a:t>
-            </a:r>
-            <a:r>
-              <a:rPr lang="en-IN" dirty="0" err="1"/>
-              <a:t>uni</a:t>
-            </a:r>
-            <a:r>
-              <a:rPr lang="en-IN" dirty="0"/>
-              <a:t> direction. (arrow points towards the goal) - Nikhil</a:t>
-            </a:r>
+              <a:rPr lang="en-US" dirty="0"/>
+              <a:t>Reduce Fonts – Ronak</a:t>
+            </a:r>
+          </a:p>
+          <a:p>
+            <a:endParaRPr lang="en-US" dirty="0">
+              <a:highlight>
+                <a:srgbClr val="FFFF00"/>
+              </a:highlight>
+            </a:endParaRPr>
+          </a:p>
+          <a:p>
+            <a:r>
+              <a:rPr lang="en-US" dirty="0">
+                <a:highlight>
+                  <a:srgbClr val="FFFF00"/>
+                </a:highlight>
+              </a:rPr>
+              <a:t>Changed: slide title from INTRODUCTION to BACKGROUND and removed BACKGROUND AND CONTEXT from the body of slide. - Nikhil</a:t>
+            </a:r>
+            <a:endParaRPr lang="en-IN" dirty="0">
+              <a:highlight>
+                <a:srgbClr val="FFFF00"/>
+              </a:highlight>
+            </a:endParaRPr>
           </a:p>
         </p:txBody>
       </p:sp>
@@ -1905,7 +2328,7 @@
           <a:p>
             <a:fld id="{17221C13-30DA-4E71-8DF4-961BA98FF8DA}" type="slidenum">
               <a:rPr lang="en-US" smtClean="0"/>
-              <a:t>7</a:t>
+              <a:t>5</a:t>
             </a:fld>
             <a:endParaRPr lang="en-US"/>
           </a:p>
@@ -1914,7 +2337,7 @@
     </p:spTree>
     <p:extLst>
       <p:ext uri="{BB962C8B-B14F-4D97-AF65-F5344CB8AC3E}">
-        <p14:creationId xmlns:p14="http://schemas.microsoft.com/office/powerpoint/2010/main" val="3763975198"/>
+        <p14:creationId xmlns:p14="http://schemas.microsoft.com/office/powerpoint/2010/main" val="2053550664"/>
       </p:ext>
     </p:extLst>
   </p:cSld>
@@ -1968,67 +2391,10 @@
           <a:bodyPr/>
           <a:lstStyle/>
           <a:p>
-            <a:pPr marL="0" marR="0" lvl="0" indent="0" algn="l" defTabSz="914400" rtl="0" eaLnBrk="1" fontAlgn="auto" latinLnBrk="0" hangingPunct="1">
-              <a:lnSpc>
-                <a:spcPct val="100000"/>
-              </a:lnSpc>
-              <a:spcBef>
-                <a:spcPts val="0"/>
-              </a:spcBef>
-              <a:spcAft>
-                <a:spcPts val="0"/>
-              </a:spcAft>
-              <a:buClrTx/>
-              <a:buSzTx/>
-              <a:buFontTx/>
-              <a:buNone/>
-              <a:tabLst/>
-              <a:defRPr/>
-            </a:pPr>
             <a:r>
               <a:rPr lang="en-US" dirty="0"/>
-              <a:t>Rename</a:t>
-            </a:r>
-            <a:r>
-              <a:rPr lang="en-US" baseline="0" dirty="0"/>
-              <a:t> Methodology to Data Analysis | </a:t>
-            </a:r>
-            <a:r>
-              <a:rPr lang="en-US" dirty="0"/>
-              <a:t>CHECK slide numbers</a:t>
-            </a:r>
-            <a:endParaRPr lang="en-IN" dirty="0"/>
-          </a:p>
-          <a:p>
-            <a:pPr marL="0" marR="0" lvl="0" indent="0" algn="l" defTabSz="914400" rtl="0" eaLnBrk="1" fontAlgn="auto" latinLnBrk="0" hangingPunct="1">
-              <a:lnSpc>
-                <a:spcPct val="100000"/>
-              </a:lnSpc>
-              <a:spcBef>
-                <a:spcPts val="0"/>
-              </a:spcBef>
-              <a:spcAft>
-                <a:spcPts val="0"/>
-              </a:spcAft>
-              <a:buClrTx/>
-              <a:buSzTx/>
-              <a:buFontTx/>
-              <a:buNone/>
-              <a:tabLst/>
-              <a:defRPr/>
-            </a:pPr>
-            <a:r>
-              <a:rPr lang="en-US" dirty="0"/>
-              <a:t>Change Key</a:t>
-            </a:r>
-            <a:r>
-              <a:rPr lang="en-US" baseline="0" dirty="0"/>
-              <a:t> Findings in every agenda slide to “Results”</a:t>
-            </a:r>
-            <a:endParaRPr lang="en-IN" dirty="0"/>
-          </a:p>
-          <a:p>
-            <a:endParaRPr lang="en-IN" dirty="0"/>
+              <a:t>Changed: Code Analysis -&gt; Coding &amp; Analysis - Nikhil</a:t>
+            </a:r>
           </a:p>
         </p:txBody>
       </p:sp>
@@ -2049,7 +2415,7 @@
           <a:p>
             <a:fld id="{17221C13-30DA-4E71-8DF4-961BA98FF8DA}" type="slidenum">
               <a:rPr lang="en-US" smtClean="0"/>
-              <a:t>8</a:t>
+              <a:t>6</a:t>
             </a:fld>
             <a:endParaRPr lang="en-US"/>
           </a:p>
@@ -2058,7 +2424,7 @@
     </p:spTree>
     <p:extLst>
       <p:ext uri="{BB962C8B-B14F-4D97-AF65-F5344CB8AC3E}">
-        <p14:creationId xmlns:p14="http://schemas.microsoft.com/office/powerpoint/2010/main" val="2097745100"/>
+        <p14:creationId xmlns:p14="http://schemas.microsoft.com/office/powerpoint/2010/main" val="3688765769"/>
       </p:ext>
     </p:extLst>
   </p:cSld>
@@ -2113,19 +2479,65 @@
           <a:lstStyle/>
           <a:p>
             <a:r>
-              <a:rPr lang="en-US" dirty="0"/>
-              <a:t>Include disposition type into text</a:t>
-            </a:r>
-          </a:p>
-          <a:p>
-            <a:endParaRPr lang="en-US" dirty="0"/>
-          </a:p>
-          <a:p>
-            <a:r>
-              <a:rPr lang="en-US" dirty="0"/>
-              <a:t>Mention duration (’14-’16)</a:t>
-            </a:r>
+              <a:rPr lang="en-IN" dirty="0"/>
+              <a:t>Change arrows from bi direction to </a:t>
+            </a:r>
+            <a:r>
+              <a:rPr lang="en-IN" dirty="0" err="1"/>
+              <a:t>uni</a:t>
+            </a:r>
+            <a:r>
+              <a:rPr lang="en-IN" dirty="0"/>
+              <a:t> direction. (arrow points towards the goal) – Nikhil</a:t>
+            </a:r>
+          </a:p>
+          <a:p>
             <a:endParaRPr lang="en-IN" dirty="0"/>
+          </a:p>
+          <a:p>
+            <a:r>
+              <a:rPr lang="en-IN" dirty="0"/>
+              <a:t>Changed:	</a:t>
+            </a:r>
+            <a:r>
+              <a:rPr lang="en-IN" dirty="0" err="1"/>
+              <a:t>Color</a:t>
+            </a:r>
+            <a:r>
+              <a:rPr lang="en-IN" dirty="0"/>
+              <a:t> of Predict.. Analysis from Blue to </a:t>
+            </a:r>
+            <a:r>
+              <a:rPr lang="en-IN" dirty="0" err="1"/>
+              <a:t>Gray</a:t>
+            </a:r>
+            <a:endParaRPr lang="en-IN" dirty="0"/>
+          </a:p>
+          <a:p>
+            <a:r>
+              <a:rPr lang="en-IN" dirty="0"/>
+              <a:t>	Predictive modelling -&gt; Results</a:t>
+            </a:r>
+          </a:p>
+          <a:p>
+            <a:r>
+              <a:rPr lang="en-IN" dirty="0"/>
+              <a:t>	Added </a:t>
+            </a:r>
+            <a:r>
+              <a:rPr lang="en-US" altLang="zh-CN" i="1" dirty="0">
+                <a:solidFill>
+                  <a:schemeClr val="bg1">
+                    <a:lumMod val="65000"/>
+                  </a:schemeClr>
+                </a:solidFill>
+              </a:rPr>
+              <a:t>To be implemented</a:t>
+            </a:r>
+            <a:r>
+              <a:rPr lang="en-IN" dirty="0"/>
+              <a:t> below Results - Nikhil</a:t>
+            </a:r>
           </a:p>
         </p:txBody>
       </p:sp>
@@ -2146,7 +2558,7 @@
           <a:p>
             <a:fld id="{17221C13-30DA-4E71-8DF4-961BA98FF8DA}" type="slidenum">
               <a:rPr lang="en-US" smtClean="0"/>
-              <a:t>9</a:t>
+              <a:t>7</a:t>
             </a:fld>
             <a:endParaRPr lang="en-US"/>
           </a:p>
@@ -2155,7 +2567,7 @@
     </p:spTree>
     <p:extLst>
       <p:ext uri="{BB962C8B-B14F-4D97-AF65-F5344CB8AC3E}">
-        <p14:creationId xmlns:p14="http://schemas.microsoft.com/office/powerpoint/2010/main" val="1882936707"/>
+        <p14:creationId xmlns:p14="http://schemas.microsoft.com/office/powerpoint/2010/main" val="3763975198"/>
       </p:ext>
     </p:extLst>
   </p:cSld>
@@ -2209,21 +2621,26 @@
           <a:bodyPr/>
           <a:lstStyle/>
           <a:p>
+            <a:pPr marL="0" marR="0" lvl="0" indent="0" algn="l" defTabSz="914400" rtl="0" eaLnBrk="1" fontAlgn="auto" latinLnBrk="0" hangingPunct="1">
+              <a:lnSpc>
+                <a:spcPct val="100000"/>
+              </a:lnSpc>
+              <a:spcBef>
+                <a:spcPts val="0"/>
+              </a:spcBef>
+              <a:spcAft>
+                <a:spcPts val="0"/>
+              </a:spcAft>
+              <a:buClrTx/>
+              <a:buSzTx/>
+              <a:buFontTx/>
+              <a:buNone/>
+              <a:tabLst/>
+              <a:defRPr/>
+            </a:pPr>
             <a:r>
               <a:rPr lang="en-US" dirty="0"/>
-              <a:t>Increase</a:t>
-            </a:r>
-            <a:r>
-              <a:rPr lang="en-US" baseline="0" dirty="0"/>
-              <a:t> size of table on the right &amp; </a:t>
-            </a:r>
-            <a:r>
-              <a:rPr lang="en-US" b="1" baseline="0" dirty="0"/>
-              <a:t>HIGHLIGHT</a:t>
-            </a:r>
-            <a:r>
-              <a:rPr lang="en-US" baseline="0" dirty="0"/>
-              <a:t> GRAND TOTAL </a:t>
+              <a:t>CHECK slide numbers</a:t>
             </a:r>
             <a:endParaRPr lang="en-IN" dirty="0"/>
           </a:p>
@@ -2246,7 +2663,7 @@
           <a:p>
             <a:fld id="{17221C13-30DA-4E71-8DF4-961BA98FF8DA}" type="slidenum">
               <a:rPr lang="en-US" smtClean="0"/>
-              <a:t>10</a:t>
+              <a:t>8</a:t>
             </a:fld>
             <a:endParaRPr lang="en-US"/>
           </a:p>
@@ -2255,7 +2672,7 @@
     </p:spTree>
     <p:extLst>
       <p:ext uri="{BB962C8B-B14F-4D97-AF65-F5344CB8AC3E}">
-        <p14:creationId xmlns:p14="http://schemas.microsoft.com/office/powerpoint/2010/main" val="3809188947"/>
+        <p14:creationId xmlns:p14="http://schemas.microsoft.com/office/powerpoint/2010/main" val="2097745100"/>
       </p:ext>
     </p:extLst>
   </p:cSld>
@@ -2311,15 +2728,16 @@
           <a:p>
             <a:r>
               <a:rPr lang="en-US" dirty="0"/>
-              <a:t>Mention key findings next to</a:t>
-            </a:r>
-            <a:r>
-              <a:rPr lang="en-US" baseline="0" dirty="0"/>
-              <a:t> graphs for SNS and  </a:t>
-            </a:r>
-            <a:r>
-              <a:rPr lang="en-US" baseline="0" dirty="0" err="1"/>
-              <a:t>QoL</a:t>
+              <a:t>Mention duration (’14-’16)</a:t>
+            </a:r>
+          </a:p>
+          <a:p>
+            <a:endParaRPr lang="en-US" dirty="0"/>
+          </a:p>
+          <a:p>
+            <a:r>
+              <a:rPr lang="en-US" dirty="0"/>
+              <a:t>Changed: Added Disposition to text -Nikhil</a:t>
             </a:r>
             <a:endParaRPr lang="en-IN" dirty="0"/>
           </a:p>
@@ -2342,7 +2760,7 @@
           <a:p>
             <a:fld id="{17221C13-30DA-4E71-8DF4-961BA98FF8DA}" type="slidenum">
               <a:rPr lang="en-US" smtClean="0"/>
-              <a:t>11</a:t>
+              <a:t>9</a:t>
             </a:fld>
             <a:endParaRPr lang="en-US"/>
           </a:p>
@@ -2351,7 +2769,7 @@
     </p:spTree>
     <p:extLst>
       <p:ext uri="{BB962C8B-B14F-4D97-AF65-F5344CB8AC3E}">
-        <p14:creationId xmlns:p14="http://schemas.microsoft.com/office/powerpoint/2010/main" val="2157850953"/>
+        <p14:creationId xmlns:p14="http://schemas.microsoft.com/office/powerpoint/2010/main" val="1882936707"/>
       </p:ext>
     </p:extLst>
   </p:cSld>
@@ -9572,15 +9990,14 @@
         <p:nvCxnSpPr>
           <p:cNvPr id="33" name="Straight Arrow Connector 32"/>
           <p:cNvCxnSpPr>
-            <a:stCxn id="23" idx="6"/>
-            <a:endCxn id="27" idx="2"/>
+            <a:cxnSpLocks/>
           </p:cNvCxnSpPr>
           <p:nvPr/>
         </p:nvCxnSpPr>
         <p:spPr>
           <a:xfrm>
-            <a:off x="6663739" y="3049767"/>
-            <a:ext cx="3771315" cy="0"/>
+            <a:off x="1581385" y="3049767"/>
+            <a:ext cx="3936857" cy="0"/>
           </a:xfrm>
           <a:prstGeom prst="straightConnector1">
             <a:avLst/>
@@ -9710,7 +10127,7 @@
         </p:nvGrpSpPr>
         <p:grpSpPr>
           <a:xfrm>
-            <a:off x="10435054" y="2607556"/>
+            <a:off x="10103979" y="2607556"/>
             <a:ext cx="884421" cy="884421"/>
             <a:chOff x="8579980" y="2967316"/>
             <a:chExt cx="884421" cy="884421"/>
@@ -9808,7 +10225,7 @@
         </p:nvGrpSpPr>
         <p:grpSpPr>
           <a:xfrm>
-            <a:off x="5779318" y="2607556"/>
+            <a:off x="5282701" y="2607556"/>
             <a:ext cx="884421" cy="884421"/>
             <a:chOff x="4198024" y="2967316"/>
             <a:chExt cx="884421" cy="884421"/>
@@ -9990,15 +10407,15 @@
         <p:nvCxnSpPr>
           <p:cNvPr id="31" name="Straight Connector 30"/>
           <p:cNvCxnSpPr>
-            <a:stCxn id="20" idx="6"/>
-            <a:endCxn id="23" idx="2"/>
+            <a:cxnSpLocks/>
+            <a:endCxn id="27" idx="2"/>
           </p:cNvCxnSpPr>
           <p:nvPr/>
         </p:nvCxnSpPr>
         <p:spPr>
           <a:xfrm>
-            <a:off x="1917066" y="3049767"/>
-            <a:ext cx="3862252" cy="0"/>
+            <a:off x="6167122" y="3024108"/>
+            <a:ext cx="3936857" cy="25659"/>
           </a:xfrm>
           <a:prstGeom prst="line">
             <a:avLst/>
@@ -10302,7 +10719,7 @@
         </p:nvCxnSpPr>
         <p:spPr>
           <a:xfrm>
-            <a:off x="6244352" y="1998133"/>
+            <a:off x="5747735" y="1998133"/>
             <a:ext cx="0" cy="490890"/>
           </a:xfrm>
           <a:prstGeom prst="line">
@@ -10332,12 +10749,14 @@
       <p:cxnSp>
         <p:nvCxnSpPr>
           <p:cNvPr id="40" name="Straight Connector 39"/>
-          <p:cNvCxnSpPr/>
+          <p:cNvCxnSpPr>
+            <a:cxnSpLocks/>
+          </p:cNvCxnSpPr>
           <p:nvPr/>
         </p:nvCxnSpPr>
         <p:spPr>
           <a:xfrm>
-            <a:off x="10884085" y="1998133"/>
+            <a:off x="10513595" y="1998133"/>
             <a:ext cx="0" cy="490890"/>
           </a:xfrm>
           <a:prstGeom prst="line">
@@ -10372,8 +10791,8 @@
         </p:nvSpPr>
         <p:spPr>
           <a:xfrm>
-            <a:off x="2372764" y="1993313"/>
-            <a:ext cx="2805976" cy="461665"/>
+            <a:off x="2083220" y="1851378"/>
+            <a:ext cx="2805976" cy="830997"/>
           </a:xfrm>
           <a:prstGeom prst="rect">
             <a:avLst/>
@@ -10407,6 +10826,16 @@
               </a:rPr>
               <a:t> </a:t>
             </a:r>
+            <a:endParaRPr lang="en-US" altLang="zh-CN" sz="2400" dirty="0">
+              <a:solidFill>
+                <a:schemeClr val="bg1">
+                  <a:lumMod val="50000"/>
+                </a:schemeClr>
+              </a:solidFill>
+            </a:endParaRPr>
+          </a:p>
+          <a:p>
+            <a:pPr algn="ctr"/>
             <a:r>
               <a:rPr lang="en-US" altLang="zh-CN" sz="2400" dirty="0">
                 <a:solidFill>
@@ -10435,8 +10864,8 @@
         </p:nvSpPr>
         <p:spPr>
           <a:xfrm>
-            <a:off x="7010380" y="1993313"/>
-            <a:ext cx="3107678" cy="461665"/>
+            <a:off x="6647865" y="1787743"/>
+            <a:ext cx="3107678" cy="830997"/>
           </a:xfrm>
           <a:prstGeom prst="rect">
             <a:avLst/>
@@ -10458,6 +10887,10 @@
               <a:rPr lang="zh-CN" altLang="en-US" sz="2400" b="1" dirty="0"/>
               <a:t> </a:t>
             </a:r>
+            <a:endParaRPr lang="en-US" altLang="zh-CN" sz="2400" b="1" dirty="0"/>
+          </a:p>
+          <a:p>
+            <a:pPr algn="ctr"/>
             <a:r>
               <a:rPr lang="en-US" altLang="zh-CN" sz="2400" b="1" dirty="0"/>
               <a:t>Analysis</a:t>
@@ -10469,12 +10902,14 @@
       <p:cxnSp>
         <p:nvCxnSpPr>
           <p:cNvPr id="44" name="Straight Arrow Connector 43"/>
-          <p:cNvCxnSpPr/>
+          <p:cNvCxnSpPr>
+            <a:cxnSpLocks/>
+          </p:cNvCxnSpPr>
           <p:nvPr/>
         </p:nvCxnSpPr>
         <p:spPr>
           <a:xfrm>
-            <a:off x="9970652" y="2231701"/>
+            <a:off x="9600162" y="2231701"/>
             <a:ext cx="730539" cy="0"/>
           </a:xfrm>
           <a:prstGeom prst="straightConnector1">
@@ -10510,7 +10945,7 @@
         </p:nvCxnSpPr>
         <p:spPr>
           <a:xfrm flipH="1">
-            <a:off x="6495922" y="2231701"/>
+            <a:off x="5999305" y="2231701"/>
             <a:ext cx="764525" cy="0"/>
           </a:xfrm>
           <a:prstGeom prst="straightConnector1">
@@ -10546,7 +10981,7 @@
         </p:nvCxnSpPr>
         <p:spPr>
           <a:xfrm>
-            <a:off x="5308290" y="2227957"/>
+            <a:off x="4811673" y="2227957"/>
             <a:ext cx="730539" cy="0"/>
           </a:xfrm>
           <a:prstGeom prst="straightConnector1">
@@ -10622,8 +11057,8 @@
         </p:nvSpPr>
         <p:spPr>
           <a:xfrm>
-            <a:off x="9491867" y="3604630"/>
-            <a:ext cx="2517324" cy="369332"/>
+            <a:off x="8970579" y="3604630"/>
+            <a:ext cx="3038612" cy="369332"/>
           </a:xfrm>
           <a:prstGeom prst="rect">
             <a:avLst/>
@@ -10662,31 +11097,7 @@
             </a:pPr>
             <a:r>
               <a:rPr lang="en-US" altLang="zh-CN" b="1" dirty="0"/>
-              <a:t>Build</a:t>
-            </a:r>
-            <a:r>
-              <a:rPr lang="zh-CN" altLang="en-US" b="1" dirty="0"/>
-              <a:t> </a:t>
-            </a:r>
-            <a:r>
-              <a:rPr lang="en-US" altLang="zh-CN" b="1" dirty="0"/>
-              <a:t>a</a:t>
-            </a:r>
-            <a:r>
-              <a:rPr lang="zh-CN" altLang="en-US" b="1" dirty="0"/>
-              <a:t> </a:t>
-            </a:r>
-            <a:r>
-              <a:rPr lang="en-US" altLang="zh-CN" b="1" dirty="0"/>
-              <a:t>predictive</a:t>
-            </a:r>
-            <a:r>
-              <a:rPr lang="zh-CN" altLang="en-US" b="1" dirty="0"/>
-              <a:t> </a:t>
-            </a:r>
-            <a:r>
-              <a:rPr lang="en-US" altLang="zh-CN" b="1" dirty="0"/>
-              <a:t>model</a:t>
+              <a:t>Final Results</a:t>
             </a:r>
             <a:endParaRPr lang="en-US" b="1" dirty="0"/>
           </a:p>
@@ -10774,7 +11185,7 @@
         </p:nvSpPr>
         <p:spPr>
           <a:xfrm>
-            <a:off x="4985690" y="3604630"/>
+            <a:off x="4402364" y="3604630"/>
             <a:ext cx="2517324" cy="369332"/>
           </a:xfrm>
           <a:prstGeom prst="rect">
@@ -10836,7 +11247,7 @@
         </p:nvSpPr>
         <p:spPr>
           <a:xfrm>
-            <a:off x="4904570" y="4044160"/>
+            <a:off x="4321244" y="4044160"/>
             <a:ext cx="3081189" cy="1477328"/>
           </a:xfrm>
           <a:prstGeom prst="rect">
@@ -11216,8 +11627,8 @@
         </p:nvSpPr>
         <p:spPr>
           <a:xfrm>
-            <a:off x="9491867" y="4086615"/>
-            <a:ext cx="2517324" cy="369332"/>
+            <a:off x="8875986" y="4086615"/>
+            <a:ext cx="3239814" cy="1477328"/>
           </a:xfrm>
           <a:prstGeom prst="rect">
             <a:avLst/>
@@ -11249,7 +11660,53 @@
             </a:pPr>
             <a:r>
               <a:rPr lang="en-US" altLang="zh-CN" dirty="0"/>
-              <a:t> Model to predict…</a:t>
+              <a:t>Results of advanced analysis </a:t>
+            </a:r>
+          </a:p>
+          <a:p>
+            <a:pPr marL="342900" marR="0" lvl="0" indent="-342900" defTabSz="914400" eaLnBrk="1" fontAlgn="auto" latinLnBrk="0" hangingPunct="1">
+              <a:lnSpc>
+                <a:spcPct val="100000"/>
+              </a:lnSpc>
+              <a:spcBef>
+                <a:spcPts val="0"/>
+              </a:spcBef>
+              <a:spcAft>
+                <a:spcPts val="0"/>
+              </a:spcAft>
+              <a:buClrTx/>
+              <a:buSzTx/>
+              <a:buFont typeface="Wingdings" panose="05000000000000000000" pitchFamily="2" charset="2"/>
+              <a:buChar char="q"/>
+              <a:tabLst/>
+              <a:defRPr/>
+            </a:pPr>
+            <a:r>
+              <a:rPr lang="en-US" altLang="zh-CN" dirty="0"/>
+              <a:t>Models to tackle Violent Crime</a:t>
+            </a:r>
+          </a:p>
+          <a:p>
+            <a:pPr marL="342900" marR="0" lvl="0" indent="-342900" defTabSz="914400" eaLnBrk="1" fontAlgn="auto" latinLnBrk="0" hangingPunct="1">
+              <a:lnSpc>
+                <a:spcPct val="100000"/>
+              </a:lnSpc>
+              <a:spcBef>
+                <a:spcPts val="0"/>
+              </a:spcBef>
+              <a:spcAft>
+                <a:spcPts val="0"/>
+              </a:spcAft>
+              <a:buClrTx/>
+              <a:buSzTx/>
+              <a:buFont typeface="Wingdings" panose="05000000000000000000" pitchFamily="2" charset="2"/>
+              <a:buChar char="q"/>
+              <a:tabLst/>
+              <a:defRPr/>
+            </a:pPr>
+            <a:r>
+              <a:rPr lang="en-US" altLang="zh-CN" dirty="0"/>
+              <a:t>Model performance evaluation</a:t>
             </a:r>
           </a:p>
         </p:txBody>
@@ -11392,8 +11849,8 @@
         </p:nvSpPr>
         <p:spPr>
           <a:xfrm>
-            <a:off x="404037" y="1552353"/>
-            <a:ext cx="10737205" cy="4708981"/>
+            <a:off x="404035" y="1737218"/>
+            <a:ext cx="10737205" cy="3831818"/>
           </a:xfrm>
           <a:prstGeom prst="rect">
             <a:avLst/>
@@ -11406,61 +11863,310 @@
           </a:bodyPr>
           <a:lstStyle/>
           <a:p>
-            <a:endParaRPr lang="en-US" dirty="0"/>
-          </a:p>
-          <a:p>
+            <a:pPr marL="285750" indent="-285750">
+              <a:lnSpc>
+                <a:spcPct val="150000"/>
+              </a:lnSpc>
+              <a:buFont typeface="Arial" panose="020B0604020202020204" pitchFamily="34" charset="0"/>
+              <a:buChar char="•"/>
+            </a:pPr>
             <a:r>
               <a:rPr lang="en-US" dirty="0"/>
-              <a:t>Extend analysis to all other beats, and all other quality of life issues</a:t>
-            </a:r>
-          </a:p>
-          <a:p>
-            <a:endParaRPr lang="en-US" dirty="0"/>
-          </a:p>
-          <a:p>
+              <a:t>Extend analysis based on prior results</a:t>
+            </a:r>
             <a:r>
               <a:rPr lang="en-US" dirty="0"/>
-              <a:t>Create a model using machine learning to :</a:t>
-            </a:r>
-          </a:p>
+              <a:t> </a:t>
+            </a:r>
+            <a:r>
+              <a:rPr lang="en-US" i="1" dirty="0">
+                <a:solidFill>
+                  <a:schemeClr val="bg1">
+                    <a:lumMod val="65000"/>
+                  </a:schemeClr>
+                </a:solidFill>
+              </a:rPr>
+              <a:t>to all other beats, and all other quality of life issues</a:t>
+            </a:r>
+          </a:p>
+          <a:p>
+            <a:pPr marL="285750" indent="-285750">
+              <a:lnSpc>
+                <a:spcPct val="150000"/>
+              </a:lnSpc>
+              <a:buFont typeface="Arial" panose="020B0604020202020204" pitchFamily="34" charset="0"/>
+              <a:buChar char="•"/>
+            </a:pPr>
+            <a:r>
+              <a:rPr lang="en-US" altLang="zh-CN" dirty="0"/>
+              <a:t>Using Machine-learning techniques, build different models</a:t>
+            </a:r>
+            <a:r>
+              <a:rPr lang="en-US" altLang="zh-CN" dirty="0"/>
+              <a:t> </a:t>
+            </a:r>
+            <a:r>
+              <a:rPr lang="en-US" altLang="zh-CN" i="1" dirty="0">
+                <a:solidFill>
+                  <a:schemeClr val="bg1">
+                    <a:lumMod val="65000"/>
+                  </a:schemeClr>
+                </a:solidFill>
+              </a:rPr>
+              <a:t>to tackle specific Violent Crime issues</a:t>
+            </a:r>
+            <a:endParaRPr lang="en-US" altLang="zh-CN" i="1" dirty="0">
+              <a:solidFill>
+                <a:schemeClr val="bg1">
+                  <a:lumMod val="65000"/>
+                </a:schemeClr>
+              </a:solidFill>
+            </a:endParaRPr>
+          </a:p>
+          <a:p>
+            <a:pPr>
+              <a:lnSpc>
+                <a:spcPct val="150000"/>
+              </a:lnSpc>
+            </a:pPr>
+            <a:endParaRPr lang="en-US" altLang="zh-CN" i="1" dirty="0">
+              <a:solidFill>
+                <a:schemeClr val="bg1">
+                  <a:lumMod val="50000"/>
+                </a:schemeClr>
+              </a:solidFill>
+            </a:endParaRPr>
+          </a:p>
+          <a:p>
+            <a:pPr marL="285750" indent="-285750">
+              <a:lnSpc>
+                <a:spcPct val="150000"/>
+              </a:lnSpc>
+              <a:buFont typeface="Arial" panose="020B0604020202020204" pitchFamily="34" charset="0"/>
+              <a:buChar char="•"/>
+            </a:pPr>
+            <a:endParaRPr lang="en-US" altLang="zh-CN" i="1" dirty="0">
+              <a:solidFill>
+                <a:schemeClr val="bg1">
+                  <a:lumMod val="50000"/>
+                </a:schemeClr>
+              </a:solidFill>
+            </a:endParaRPr>
+          </a:p>
+          <a:p>
+            <a:pPr marL="285750" indent="-285750">
+              <a:lnSpc>
+                <a:spcPct val="150000"/>
+              </a:lnSpc>
+              <a:buFont typeface="Arial" panose="020B0604020202020204" pitchFamily="34" charset="0"/>
+              <a:buChar char="•"/>
+            </a:pPr>
+            <a:endParaRPr lang="en-US" altLang="zh-CN" i="1" dirty="0">
+              <a:solidFill>
+                <a:schemeClr val="bg1">
+                  <a:lumMod val="50000"/>
+                </a:schemeClr>
+              </a:solidFill>
+            </a:endParaRPr>
+          </a:p>
+          <a:p>
+            <a:pPr>
+              <a:lnSpc>
+                <a:spcPct val="150000"/>
+              </a:lnSpc>
+            </a:pPr>
+            <a:endParaRPr lang="en-US" altLang="zh-CN" i="1" dirty="0">
+              <a:solidFill>
+                <a:schemeClr val="bg1">
+                  <a:lumMod val="50000"/>
+                </a:schemeClr>
+              </a:solidFill>
+            </a:endParaRPr>
+          </a:p>
+          <a:p>
+            <a:pPr>
+              <a:lnSpc>
+                <a:spcPct val="150000"/>
+              </a:lnSpc>
+            </a:pPr>
+            <a:endParaRPr lang="en-US" altLang="zh-CN" i="1" dirty="0">
+              <a:solidFill>
+                <a:schemeClr val="bg1">
+                  <a:lumMod val="50000"/>
+                </a:schemeClr>
+              </a:solidFill>
+            </a:endParaRPr>
+          </a:p>
+          <a:p>
+            <a:pPr marL="285750" indent="-285750">
+              <a:lnSpc>
+                <a:spcPct val="150000"/>
+              </a:lnSpc>
+              <a:buFont typeface="Arial" panose="020B0604020202020204" pitchFamily="34" charset="0"/>
+              <a:buChar char="•"/>
+            </a:pPr>
+            <a:r>
+              <a:rPr lang="en-US" altLang="zh-CN" dirty="0"/>
+              <a:t>Select metrics to evaluate model performance</a:t>
+            </a:r>
+          </a:p>
+          <a:p>
+            <a:pPr marL="285750" indent="-285750">
+              <a:lnSpc>
+                <a:spcPct val="150000"/>
+              </a:lnSpc>
+              <a:buFont typeface="Arial" panose="020B0604020202020204" pitchFamily="34" charset="0"/>
+              <a:buChar char="•"/>
+            </a:pPr>
+            <a:r>
+              <a:rPr lang="en-US" dirty="0"/>
+              <a:t>Run the model on live data!</a:t>
+            </a:r>
+          </a:p>
+        </p:txBody>
+      </p:sp>
+      <p:pic>
+        <p:nvPicPr>
+          <p:cNvPr id="3" name="Picture 2"/>
+          <p:cNvPicPr>
+            <a:picLocks noChangeAspect="1"/>
+          </p:cNvPicPr>
+          <p:nvPr/>
+        </p:nvPicPr>
+        <p:blipFill rotWithShape="1">
+          <a:blip r:embed="rId4"/>
+          <a:srcRect t="11042" b="12203"/>
+          <a:stretch/>
+        </p:blipFill>
+        <p:spPr>
+          <a:xfrm>
+            <a:off x="2716415" y="2734785"/>
+            <a:ext cx="6112443" cy="1836683"/>
+          </a:xfrm>
+          <a:prstGeom prst="rect">
+            <a:avLst/>
+          </a:prstGeom>
+        </p:spPr>
+      </p:pic>
+      <p:sp>
+        <p:nvSpPr>
+          <p:cNvPr id="5" name="TextBox 4"/>
+          <p:cNvSpPr txBox="1"/>
+          <p:nvPr/>
+        </p:nvSpPr>
+        <p:spPr>
+          <a:xfrm>
+            <a:off x="1291489" y="3237629"/>
+            <a:ext cx="1670970" cy="830997"/>
+          </a:xfrm>
+          <a:prstGeom prst="rect">
+            <a:avLst/>
+          </a:prstGeom>
+          <a:noFill/>
+        </p:spPr>
+        <p:txBody>
+          <a:bodyPr wrap="none" rtlCol="0">
+            <a:spAutoFit/>
+          </a:bodyPr>
+          <a:lstStyle/>
+          <a:p>
+            <a:pPr algn="ctr"/>
+            <a:r>
+              <a:rPr lang="en-US" sz="1600" i="1" dirty="0">
+                <a:solidFill>
+                  <a:schemeClr val="tx1">
+                    <a:lumMod val="65000"/>
+                    <a:lumOff val="35000"/>
+                  </a:schemeClr>
+                </a:solidFill>
+              </a:rPr>
+              <a:t>Time Series info </a:t>
+            </a:r>
+          </a:p>
+          <a:p>
+            <a:pPr algn="ctr"/>
+            <a:r>
+              <a:rPr lang="en-US" sz="1600" i="1" dirty="0">
+                <a:solidFill>
+                  <a:schemeClr val="tx1">
+                    <a:lumMod val="65000"/>
+                    <a:lumOff val="35000"/>
+                  </a:schemeClr>
+                </a:solidFill>
+              </a:rPr>
+              <a:t>Geographic info</a:t>
+            </a:r>
+          </a:p>
+          <a:p>
+            <a:pPr algn="ctr"/>
+            <a:r>
+              <a:rPr lang="en-US" sz="1600" i="1" dirty="0">
+                <a:solidFill>
+                  <a:schemeClr val="tx1">
+                    <a:lumMod val="65000"/>
+                    <a:lumOff val="35000"/>
+                  </a:schemeClr>
+                </a:solidFill>
+              </a:rPr>
+              <a:t>Violent Crime info</a:t>
+            </a:r>
+          </a:p>
+        </p:txBody>
+      </p:sp>
+      <p:sp>
+        <p:nvSpPr>
+          <p:cNvPr id="8" name="TextBox 7"/>
+          <p:cNvSpPr txBox="1"/>
+          <p:nvPr/>
+        </p:nvSpPr>
+        <p:spPr>
+          <a:xfrm>
+            <a:off x="8900977" y="3389255"/>
+            <a:ext cx="2007281" cy="584775"/>
+          </a:xfrm>
+          <a:prstGeom prst="rect">
+            <a:avLst/>
+          </a:prstGeom>
+          <a:noFill/>
+        </p:spPr>
+        <p:txBody>
+          <a:bodyPr wrap="none" rtlCol="0">
+            <a:spAutoFit/>
+          </a:bodyPr>
+          <a:lstStyle/>
           <a:p>
             <a:pPr marL="342900" indent="-342900">
-              <a:buAutoNum type="arabicParenR"/>
+              <a:buFont typeface="+mj-lt"/>
+              <a:buAutoNum type="arabicPeriod"/>
             </a:pPr>
-            <a:endParaRPr lang="en-US" dirty="0"/>
-          </a:p>
-          <a:p>
-            <a:r>
-              <a:rPr lang="en-US" sz="4800" dirty="0"/>
-              <a:t>DRAW MODEL SCHEMATICALLY</a:t>
-            </a:r>
-          </a:p>
-          <a:p>
-            <a:endParaRPr lang="en-US" dirty="0"/>
-          </a:p>
-          <a:p>
-            <a:endParaRPr lang="en-US" dirty="0"/>
-          </a:p>
-          <a:p>
-            <a:endParaRPr lang="en-US" dirty="0"/>
-          </a:p>
-          <a:p>
-            <a:endParaRPr lang="en-US" dirty="0"/>
-          </a:p>
-          <a:p>
-            <a:endParaRPr lang="en-US" dirty="0"/>
-          </a:p>
-          <a:p>
-            <a:endParaRPr lang="en-US" dirty="0"/>
-          </a:p>
-          <a:p>
-            <a:endParaRPr lang="en-US" dirty="0"/>
-          </a:p>
-          <a:p>
-            <a:endParaRPr lang="en-US" dirty="0"/>
-          </a:p>
-          <a:p>
-            <a:endParaRPr lang="en-IN" dirty="0"/>
+            <a:r>
+              <a:rPr lang="en-US" sz="1600" i="1" dirty="0">
+                <a:solidFill>
+                  <a:schemeClr val="tx1">
+                    <a:lumMod val="65000"/>
+                    <a:lumOff val="35000"/>
+                  </a:schemeClr>
+                </a:solidFill>
+              </a:rPr>
+              <a:t>Number of Stops</a:t>
+            </a:r>
+          </a:p>
+          <a:p>
+            <a:pPr marL="342900" indent="-342900">
+              <a:buFont typeface="+mj-lt"/>
+              <a:buAutoNum type="arabicPeriod"/>
+            </a:pPr>
+            <a:r>
+              <a:rPr lang="en-US" sz="1600" i="1" dirty="0">
+                <a:solidFill>
+                  <a:schemeClr val="tx1">
+                    <a:lumMod val="65000"/>
+                    <a:lumOff val="35000"/>
+                  </a:schemeClr>
+                </a:solidFill>
+              </a:rPr>
+              <a:t>Location of Stops</a:t>
+            </a:r>
           </a:p>
         </p:txBody>
       </p:sp>
@@ -11640,6 +12346,45 @@
           </a:p>
         </p:txBody>
       </p:sp>
+      <p:sp>
+        <p:nvSpPr>
+          <p:cNvPr id="9" name="TextBox 8"/>
+          <p:cNvSpPr txBox="1"/>
+          <p:nvPr/>
+        </p:nvSpPr>
+        <p:spPr>
+          <a:xfrm>
+            <a:off x="1123122" y="2495731"/>
+            <a:ext cx="4701208" cy="923330"/>
+          </a:xfrm>
+          <a:prstGeom prst="rect">
+            <a:avLst/>
+          </a:prstGeom>
+          <a:noFill/>
+        </p:spPr>
+        <p:txBody>
+          <a:bodyPr wrap="square" rtlCol="0">
+            <a:spAutoFit/>
+          </a:bodyPr>
+          <a:lstStyle/>
+          <a:p>
+            <a:pPr algn="ctr"/>
+            <a:r>
+              <a:rPr lang="en-US" altLang="zh-CN" sz="5400" b="1" dirty="0">
+                <a:solidFill>
+                  <a:srgbClr val="0A264B"/>
+                </a:solidFill>
+              </a:rPr>
+              <a:t>QA</a:t>
+            </a:r>
+            <a:endParaRPr lang="en-US" sz="5400" b="1" dirty="0">
+              <a:solidFill>
+                <a:srgbClr val="0A264B"/>
+              </a:solidFill>
+            </a:endParaRPr>
+          </a:p>
+        </p:txBody>
+      </p:sp>
     </p:spTree>
     <p:extLst>
       <p:ext uri="{BB962C8B-B14F-4D97-AF65-F5344CB8AC3E}">
@@ -12447,7 +13192,7 @@
           <p:nvPr/>
         </p:nvPicPr>
         <p:blipFill rotWithShape="1">
-          <a:blip r:embed="rId2">
+          <a:blip r:embed="rId3">
             <a:extLst>
               <a:ext uri="{28A0092B-C50C-407E-A947-70E740481C1C}">
                 <a14:useLocalDpi xmlns:a14="http://schemas.microsoft.com/office/drawing/2010/main" val="0"/>
@@ -12974,7 +13719,7 @@
                   <a:schemeClr val="bg1"/>
                 </a:solidFill>
               </a:rPr>
-              <a:t>INTRODUCTION</a:t>
+              <a:t>BACKGROUND</a:t>
             </a:r>
             <a:endParaRPr lang="en-US" sz="3600" dirty="0">
               <a:solidFill>
@@ -12986,207 +13731,6 @@
       </p:sp>
       <p:sp>
         <p:nvSpPr>
-          <p:cNvPr id="30" name="Rectangle 8"/>
-          <p:cNvSpPr>
-            <a:spLocks noChangeArrowheads="1"/>
-          </p:cNvSpPr>
-          <p:nvPr/>
-        </p:nvSpPr>
-        <p:spPr bwMode="gray">
-          <a:xfrm>
-            <a:off x="4080481" y="1587528"/>
-            <a:ext cx="4034212" cy="387798"/>
-          </a:xfrm>
-          <a:prstGeom prst="rect">
-            <a:avLst/>
-          </a:prstGeom>
-          <a:solidFill>
-            <a:schemeClr val="bg2">
-              <a:lumMod val="75000"/>
-            </a:schemeClr>
-          </a:solidFill>
-          <a:ln>
-            <a:noFill/>
-          </a:ln>
-          <a:effectLst/>
-          <a:extLst/>
-        </p:spPr>
-        <p:txBody>
-          <a:bodyPr lIns="0" tIns="0" rIns="0" bIns="0">
-            <a:spAutoFit/>
-          </a:bodyPr>
-          <a:lstStyle>
-            <a:lvl1pPr marL="228600" indent="-228600" defTabSz="769938">
-              <a:buClr>
-                <a:schemeClr val="tx2"/>
-              </a:buClr>
-              <a:defRPr sz="1600">
-                <a:solidFill>
-                  <a:schemeClr val="tx1"/>
-                </a:solidFill>
-                <a:latin typeface="Arial" panose="020B0604020202020204" pitchFamily="34" charset="0"/>
-              </a:defRPr>
-            </a:lvl1pPr>
-            <a:lvl2pPr marL="581025" indent="-128588" defTabSz="769938">
-              <a:buClr>
-                <a:schemeClr val="tx2"/>
-              </a:buClr>
-              <a:buSzPct val="125000"/>
-              <a:buFont typeface="Arial" panose="020B0604020202020204" pitchFamily="34" charset="0"/>
-              <a:buChar char="▪"/>
-              <a:defRPr sz="1600">
-                <a:solidFill>
-                  <a:schemeClr val="tx1"/>
-                </a:solidFill>
-                <a:latin typeface="Arial" panose="020B0604020202020204" pitchFamily="34" charset="0"/>
-              </a:defRPr>
-            </a:lvl2pPr>
-            <a:lvl3pPr marL="858838" indent="-163513" defTabSz="769938">
-              <a:buClr>
-                <a:schemeClr val="tx2"/>
-              </a:buClr>
-              <a:buSzPct val="120000"/>
-              <a:buFont typeface="Arial" panose="020B0604020202020204" pitchFamily="34" charset="0"/>
-              <a:buChar char="–"/>
-              <a:defRPr sz="1600">
-                <a:solidFill>
-                  <a:schemeClr val="tx1"/>
-                </a:solidFill>
-                <a:latin typeface="Arial" panose="020B0604020202020204" pitchFamily="34" charset="0"/>
-              </a:defRPr>
-            </a:lvl3pPr>
-            <a:lvl4pPr marL="1108075" indent="-134938" defTabSz="769938">
-              <a:buClr>
-                <a:schemeClr val="tx2"/>
-              </a:buClr>
-              <a:buSzPct val="120000"/>
-              <a:buFont typeface="Arial" panose="020B0604020202020204" pitchFamily="34" charset="0"/>
-              <a:buChar char="▫"/>
-              <a:defRPr sz="1600">
-                <a:solidFill>
-                  <a:schemeClr val="tx1"/>
-                </a:solidFill>
-                <a:latin typeface="Arial" panose="020B0604020202020204" pitchFamily="34" charset="0"/>
-              </a:defRPr>
-            </a:lvl4pPr>
-            <a:lvl5pPr marL="1377950" indent="-155575" defTabSz="769938">
-              <a:buClr>
-                <a:schemeClr val="tx2"/>
-              </a:buClr>
-              <a:buSzPct val="89000"/>
-              <a:buFont typeface="Arial" panose="020B0604020202020204" pitchFamily="34" charset="0"/>
-              <a:buChar char="-"/>
-              <a:defRPr sz="1600">
-                <a:solidFill>
-                  <a:schemeClr val="tx1"/>
-                </a:solidFill>
-                <a:latin typeface="Arial" panose="020B0604020202020204" pitchFamily="34" charset="0"/>
-              </a:defRPr>
-            </a:lvl5pPr>
-            <a:lvl6pPr marL="1835150" indent="-155575" defTabSz="769938" fontAlgn="base">
-              <a:spcBef>
-                <a:spcPct val="0"/>
-              </a:spcBef>
-              <a:spcAft>
-                <a:spcPct val="0"/>
-              </a:spcAft>
-              <a:buClr>
-                <a:schemeClr val="tx2"/>
-              </a:buClr>
-              <a:buSzPct val="89000"/>
-              <a:buFont typeface="Arial" panose="020B0604020202020204" pitchFamily="34" charset="0"/>
-              <a:buChar char="-"/>
-              <a:defRPr sz="1600">
-                <a:solidFill>
-                  <a:schemeClr val="tx1"/>
-                </a:solidFill>
-                <a:latin typeface="Arial" panose="020B0604020202020204" pitchFamily="34" charset="0"/>
-              </a:defRPr>
-            </a:lvl6pPr>
-            <a:lvl7pPr marL="2292350" indent="-155575" defTabSz="769938" fontAlgn="base">
-              <a:spcBef>
-                <a:spcPct val="0"/>
-              </a:spcBef>
-              <a:spcAft>
-                <a:spcPct val="0"/>
-              </a:spcAft>
-              <a:buClr>
-                <a:schemeClr val="tx2"/>
-              </a:buClr>
-              <a:buSzPct val="89000"/>
-              <a:buFont typeface="Arial" panose="020B0604020202020204" pitchFamily="34" charset="0"/>
-              <a:buChar char="-"/>
-              <a:defRPr sz="1600">
-                <a:solidFill>
-                  <a:schemeClr val="tx1"/>
-                </a:solidFill>
-                <a:latin typeface="Arial" panose="020B0604020202020204" pitchFamily="34" charset="0"/>
-              </a:defRPr>
-            </a:lvl7pPr>
-            <a:lvl8pPr marL="2749550" indent="-155575" defTabSz="769938" fontAlgn="base">
-              <a:spcBef>
-                <a:spcPct val="0"/>
-              </a:spcBef>
-              <a:spcAft>
-                <a:spcPct val="0"/>
-              </a:spcAft>
-              <a:buClr>
-                <a:schemeClr val="tx2"/>
-              </a:buClr>
-              <a:buSzPct val="89000"/>
-              <a:buFont typeface="Arial" panose="020B0604020202020204" pitchFamily="34" charset="0"/>
-              <a:buChar char="-"/>
-              <a:defRPr sz="1600">
-                <a:solidFill>
-                  <a:schemeClr val="tx1"/>
-                </a:solidFill>
-                <a:latin typeface="Arial" panose="020B0604020202020204" pitchFamily="34" charset="0"/>
-              </a:defRPr>
-            </a:lvl8pPr>
-            <a:lvl9pPr marL="3206750" indent="-155575" defTabSz="769938" fontAlgn="base">
-              <a:spcBef>
-                <a:spcPct val="0"/>
-              </a:spcBef>
-              <a:spcAft>
-                <a:spcPct val="0"/>
-              </a:spcAft>
-              <a:buClr>
-                <a:schemeClr val="tx2"/>
-              </a:buClr>
-              <a:buSzPct val="89000"/>
-              <a:buFont typeface="Arial" panose="020B0604020202020204" pitchFamily="34" charset="0"/>
-              <a:buChar char="-"/>
-              <a:defRPr sz="1600">
-                <a:solidFill>
-                  <a:schemeClr val="tx1"/>
-                </a:solidFill>
-                <a:latin typeface="Arial" panose="020B0604020202020204" pitchFamily="34" charset="0"/>
-              </a:defRPr>
-            </a:lvl9pPr>
-          </a:lstStyle>
-          <a:p>
-            <a:pPr marL="224097" indent="-224097" algn="ctr" defTabSz="754770">
-              <a:lnSpc>
-                <a:spcPct val="90000"/>
-              </a:lnSpc>
-              <a:spcAft>
-                <a:spcPct val="20000"/>
-              </a:spcAft>
-            </a:pPr>
-            <a:r>
-              <a:rPr lang="en-US" altLang="en-US" sz="2800" b="1" kern="0" dirty="0">
-                <a:solidFill>
-                  <a:schemeClr val="bg1"/>
-                </a:solidFill>
-                <a:latin typeface="+mn-lt"/>
-              </a:rPr>
-              <a:t>BACKGROUND</a:t>
-            </a:r>
-          </a:p>
-        </p:txBody>
-      </p:sp>
-      <p:sp>
-        <p:nvSpPr>
           <p:cNvPr id="31" name="Rectangle 10"/>
           <p:cNvSpPr>
             <a:spLocks noChangeArrowheads="1"/>
@@ -13195,7 +13739,7 @@
         </p:nvSpPr>
         <p:spPr bwMode="gray">
           <a:xfrm>
-            <a:off x="545909" y="2043752"/>
+            <a:off x="545909" y="1699298"/>
             <a:ext cx="11191165" cy="615553"/>
           </a:xfrm>
           <a:prstGeom prst="rect">
@@ -13427,7 +13971,7 @@
         </p:nvSpPr>
         <p:spPr>
           <a:xfrm>
-            <a:off x="5886046" y="2698314"/>
+            <a:off x="5869341" y="2496256"/>
             <a:ext cx="423081" cy="252222"/>
           </a:xfrm>
           <a:prstGeom prst="downArrow">
@@ -13477,7 +14021,7 @@
         </p:nvSpPr>
         <p:spPr bwMode="gray">
           <a:xfrm>
-            <a:off x="4080481" y="2955475"/>
+            <a:off x="4063776" y="2753417"/>
             <a:ext cx="4034212" cy="387798"/>
           </a:xfrm>
           <a:prstGeom prst="rect">
@@ -14654,7 +15198,7 @@
           <p:nvPr/>
         </p:nvPicPr>
         <p:blipFill rotWithShape="1">
-          <a:blip r:embed="rId2">
+          <a:blip r:embed="rId3">
             <a:extLst>
               <a:ext uri="{28A0092B-C50C-407E-A947-70E740481C1C}">
                 <a14:useLocalDpi xmlns:a14="http://schemas.microsoft.com/office/drawing/2010/main" val="0"/>
@@ -14754,7 +15298,7 @@
           <p:nvPr/>
         </p:nvPicPr>
         <p:blipFill>
-          <a:blip r:embed="rId3">
+          <a:blip r:embed="rId4">
             <a:extLst>
               <a:ext uri="{28A0092B-C50C-407E-A947-70E740481C1C}">
                 <a14:useLocalDpi xmlns:a14="http://schemas.microsoft.com/office/drawing/2010/main" val="0"/>
@@ -14829,7 +15373,7 @@
             <p:nvPr/>
           </p:nvPicPr>
           <p:blipFill>
-            <a:blip r:embed="rId4">
+            <a:blip r:embed="rId5">
               <a:extLst>
                 <a:ext uri="{28A0092B-C50C-407E-A947-70E740481C1C}">
                   <a14:useLocalDpi xmlns:a14="http://schemas.microsoft.com/office/drawing/2010/main" val="0"/>
@@ -14920,7 +15464,7 @@
             <p:nvPr/>
           </p:nvPicPr>
           <p:blipFill>
-            <a:blip r:embed="rId5">
+            <a:blip r:embed="rId6">
               <a:extLst>
                 <a:ext uri="{28A0092B-C50C-407E-A947-70E740481C1C}">
                   <a14:useLocalDpi xmlns:a14="http://schemas.microsoft.com/office/drawing/2010/main" val="0"/>
@@ -15060,7 +15604,7 @@
             <p:nvPr/>
           </p:nvPicPr>
           <p:blipFill>
-            <a:blip r:embed="rId6">
+            <a:blip r:embed="rId7">
               <a:extLst>
                 <a:ext uri="{28A0092B-C50C-407E-A947-70E740481C1C}">
                   <a14:useLocalDpi xmlns:a14="http://schemas.microsoft.com/office/drawing/2010/main" val="0"/>
@@ -16302,15 +16846,7 @@
             </a:pPr>
             <a:r>
               <a:rPr lang="en-US" altLang="zh-CN" b="1" dirty="0"/>
-              <a:t>Predictive</a:t>
-            </a:r>
-            <a:r>
-              <a:rPr lang="zh-CN" altLang="en-US" b="1" dirty="0"/>
-              <a:t> </a:t>
-            </a:r>
-            <a:r>
-              <a:rPr lang="en-US" altLang="zh-CN" b="1" dirty="0"/>
-              <a:t>Modelling</a:t>
+              <a:t>Results</a:t>
             </a:r>
             <a:endParaRPr lang="en-US" b="1" dirty="0"/>
           </a:p>
@@ -16460,7 +16996,7 @@
         </p:nvSpPr>
         <p:spPr>
           <a:xfrm>
-            <a:off x="4904570" y="4044160"/>
+            <a:off x="4760192" y="4044160"/>
             <a:ext cx="3081189" cy="1477328"/>
           </a:xfrm>
           <a:prstGeom prst="rect">

</xml_diff>